<commit_message>
added what to say
</commit_message>
<xml_diff>
--- a/Thesis/Presentation.pptx
+++ b/Thesis/Presentation.pptx
@@ -5,7 +5,7 @@
     <p:sldMasterId id="2147483648" r:id="rId1"/>
   </p:sldMasterIdLst>
   <p:notesMasterIdLst>
-    <p:notesMasterId r:id="rId17"/>
+    <p:notesMasterId r:id="rId16"/>
   </p:notesMasterIdLst>
   <p:sldIdLst>
     <p:sldId id="256" r:id="rId2"/>
@@ -22,7 +22,6 @@
     <p:sldId id="263" r:id="rId13"/>
     <p:sldId id="269" r:id="rId14"/>
     <p:sldId id="264" r:id="rId15"/>
-    <p:sldId id="270" r:id="rId16"/>
   </p:sldIdLst>
   <p:sldSz cx="9144000" cy="6858000" type="screen4x3"/>
   <p:notesSz cx="6858000" cy="9144000"/>
@@ -132,10 +131,6 @@
 
 <file path=ppt/comments/comment1.xml><?xml version="1.0" encoding="utf-8"?>
 <p:cmLst xmlns:a="http://schemas.openxmlformats.org/drawingml/2006/main" xmlns:r="http://schemas.openxmlformats.org/officeDocument/2006/relationships" xmlns:p="http://schemas.openxmlformats.org/presentationml/2006/main">
-  <p:cm authorId="0" dt="2019-02-05T19:19:36.504" idx="1">
-    <p:pos x="5394" y="2536"/>
-    <p:text>You resized this picture and now it is totally fucked up</p:text>
-  </p:cm>
   <p:cm authorId="0" dt="2019-02-05T19:29:43.321" idx="2">
     <p:pos x="5099" y="1231"/>
     <p:text>I would skip all this now. Instead I would just introduce that the study is performed in 2 phases, interview and evaluation, and walk the audience through the flow chart.</p:text>
@@ -225,7 +220,7 @@
           <a:p>
             <a:fld id="{5C808929-5CCB-AA46-9985-D9F6DD8700A2}" type="datetimeFigureOut">
               <a:rPr lang="sv-SE" smtClean="0"/>
-              <a:t>19-02-07</a:t>
+              <a:t>19-02-10</a:t>
             </a:fld>
             <a:endParaRPr lang="sv-SE"/>
           </a:p>
@@ -631,11 +626,7 @@
             </a:r>
             <a:r>
               <a:rPr lang="sv-SE" dirty="0" smtClean="0"/>
-              <a:t>designing </a:t>
-            </a:r>
-            <a:r>
-              <a:rPr lang="sv-SE" dirty="0" smtClean="0"/>
-              <a:t>e-</a:t>
+              <a:t>designing e-</a:t>
             </a:r>
             <a:r>
               <a:rPr lang="sv-SE" dirty="0" err="1" smtClean="0"/>
@@ -907,6 +898,926 @@
           <a:bodyPr/>
           <a:lstStyle/>
           <a:p>
+            <a:pPr marL="228600" indent="-228600">
+              <a:buAutoNum type="arabicParenR"/>
+            </a:pPr>
+            <a:r>
+              <a:rPr lang="sv-SE" sz="1200" b="0" kern="1200" dirty="0" smtClean="0">
+                <a:solidFill>
+                  <a:schemeClr val="tx1"/>
+                </a:solidFill>
+                <a:effectLst/>
+                <a:latin typeface="+mn-lt"/>
+                <a:ea typeface="+mn-ea"/>
+                <a:cs typeface="+mn-cs"/>
+              </a:rPr>
+              <a:t>Figuren</a:t>
+            </a:r>
+            <a:r>
+              <a:rPr lang="sv-SE" sz="1200" b="0" kern="1200" baseline="0" dirty="0" smtClean="0">
+                <a:solidFill>
+                  <a:schemeClr val="tx1"/>
+                </a:solidFill>
+                <a:effectLst/>
+                <a:latin typeface="+mn-lt"/>
+                <a:ea typeface="+mn-ea"/>
+                <a:cs typeface="+mn-cs"/>
+              </a:rPr>
+              <a:t> visar </a:t>
+            </a:r>
+            <a:r>
+              <a:rPr lang="sv-SE" sz="1200" b="0" kern="1200" dirty="0" smtClean="0">
+                <a:solidFill>
+                  <a:schemeClr val="tx1"/>
+                </a:solidFill>
+                <a:effectLst/>
+                <a:latin typeface="+mn-lt"/>
+                <a:ea typeface="+mn-ea"/>
+                <a:cs typeface="+mn-cs"/>
+              </a:rPr>
+              <a:t>DIM resultat per fas/element </a:t>
+            </a:r>
+            <a:r>
+              <a:rPr lang="sv-SE" sz="1200" b="0" kern="1200" dirty="0" err="1" smtClean="0">
+                <a:solidFill>
+                  <a:schemeClr val="tx1"/>
+                </a:solidFill>
+                <a:effectLst/>
+                <a:latin typeface="+mn-lt"/>
+                <a:ea typeface="+mn-ea"/>
+                <a:cs typeface="+mn-cs"/>
+              </a:rPr>
+              <a:t>för</a:t>
+            </a:r>
+            <a:r>
+              <a:rPr lang="sv-SE" sz="1200" b="0" kern="1200" dirty="0" smtClean="0">
+                <a:solidFill>
+                  <a:schemeClr val="tx1"/>
+                </a:solidFill>
+                <a:effectLst/>
+                <a:latin typeface="+mn-lt"/>
+                <a:ea typeface="+mn-ea"/>
+                <a:cs typeface="+mn-cs"/>
+              </a:rPr>
+              <a:t> fyra av Grades tidigare kurser. </a:t>
+            </a:r>
+            <a:r>
+              <a:rPr lang="sv-SE" sz="1200" kern="1200" dirty="0" smtClean="0">
+                <a:solidFill>
+                  <a:schemeClr val="tx1"/>
+                </a:solidFill>
+                <a:effectLst/>
+                <a:latin typeface="+mn-lt"/>
+                <a:ea typeface="+mn-ea"/>
+                <a:cs typeface="+mn-cs"/>
+              </a:rPr>
+              <a:t>Punkterna representerar </a:t>
+            </a:r>
+            <a:r>
+              <a:rPr lang="sv-SE" sz="1200" kern="1200" dirty="0" err="1" smtClean="0">
+                <a:solidFill>
+                  <a:schemeClr val="tx1"/>
+                </a:solidFill>
+                <a:effectLst/>
+                <a:latin typeface="+mn-lt"/>
+                <a:ea typeface="+mn-ea"/>
+                <a:cs typeface="+mn-cs"/>
+              </a:rPr>
+              <a:t>poäng</a:t>
+            </a:r>
+            <a:r>
+              <a:rPr lang="sv-SE" sz="1200" kern="1200" dirty="0" smtClean="0">
+                <a:solidFill>
+                  <a:schemeClr val="tx1"/>
+                </a:solidFill>
+                <a:effectLst/>
+                <a:latin typeface="+mn-lt"/>
+                <a:ea typeface="+mn-ea"/>
+                <a:cs typeface="+mn-cs"/>
+              </a:rPr>
+              <a:t> </a:t>
+            </a:r>
+            <a:r>
+              <a:rPr lang="sv-SE" sz="1200" kern="1200" dirty="0" err="1" smtClean="0">
+                <a:solidFill>
+                  <a:schemeClr val="tx1"/>
+                </a:solidFill>
+                <a:effectLst/>
+                <a:latin typeface="+mn-lt"/>
+                <a:ea typeface="+mn-ea"/>
+                <a:cs typeface="+mn-cs"/>
+              </a:rPr>
+              <a:t>från</a:t>
+            </a:r>
+            <a:r>
+              <a:rPr lang="sv-SE" sz="1200" kern="1200" dirty="0" smtClean="0">
+                <a:solidFill>
+                  <a:schemeClr val="tx1"/>
+                </a:solidFill>
+                <a:effectLst/>
+                <a:latin typeface="+mn-lt"/>
+                <a:ea typeface="+mn-ea"/>
+                <a:cs typeface="+mn-cs"/>
+              </a:rPr>
+              <a:t> vardera DIM fas, den </a:t>
+            </a:r>
+            <a:r>
+              <a:rPr lang="sv-SE" sz="1200" kern="1200" dirty="0" err="1" smtClean="0">
+                <a:solidFill>
+                  <a:schemeClr val="tx1"/>
+                </a:solidFill>
+                <a:effectLst/>
+                <a:latin typeface="+mn-lt"/>
+                <a:ea typeface="+mn-ea"/>
+                <a:cs typeface="+mn-cs"/>
+              </a:rPr>
+              <a:t>vågräta</a:t>
+            </a:r>
+            <a:r>
+              <a:rPr lang="sv-SE" sz="1200" kern="1200" dirty="0" smtClean="0">
+                <a:solidFill>
+                  <a:schemeClr val="tx1"/>
+                </a:solidFill>
+                <a:effectLst/>
+                <a:latin typeface="+mn-lt"/>
+                <a:ea typeface="+mn-ea"/>
+                <a:cs typeface="+mn-cs"/>
+              </a:rPr>
+              <a:t> linjen </a:t>
+            </a:r>
+            <a:r>
+              <a:rPr lang="sv-SE" sz="1200" kern="1200" dirty="0" err="1" smtClean="0">
+                <a:solidFill>
+                  <a:schemeClr val="tx1"/>
+                </a:solidFill>
+                <a:effectLst/>
+                <a:latin typeface="+mn-lt"/>
+                <a:ea typeface="+mn-ea"/>
+                <a:cs typeface="+mn-cs"/>
+              </a:rPr>
+              <a:t>är</a:t>
+            </a:r>
+            <a:r>
+              <a:rPr lang="sv-SE" sz="1200" kern="1200" dirty="0" smtClean="0">
+                <a:solidFill>
+                  <a:schemeClr val="tx1"/>
+                </a:solidFill>
+                <a:effectLst/>
+                <a:latin typeface="+mn-lt"/>
+                <a:ea typeface="+mn-ea"/>
+                <a:cs typeface="+mn-cs"/>
+              </a:rPr>
+              <a:t> </a:t>
+            </a:r>
+            <a:r>
+              <a:rPr lang="sv-SE" sz="1200" kern="1200" dirty="0" err="1" smtClean="0">
+                <a:solidFill>
+                  <a:schemeClr val="tx1"/>
+                </a:solidFill>
+                <a:effectLst/>
+                <a:latin typeface="+mn-lt"/>
+                <a:ea typeface="+mn-ea"/>
+                <a:cs typeface="+mn-cs"/>
+              </a:rPr>
+              <a:t>medelvärdet</a:t>
+            </a:r>
+            <a:r>
+              <a:rPr lang="sv-SE" sz="1200" kern="1200" dirty="0" smtClean="0">
+                <a:solidFill>
+                  <a:schemeClr val="tx1"/>
+                </a:solidFill>
+                <a:effectLst/>
+                <a:latin typeface="+mn-lt"/>
+                <a:ea typeface="+mn-ea"/>
+                <a:cs typeface="+mn-cs"/>
+              </a:rPr>
+              <a:t> och den vertikala linjen </a:t>
+            </a:r>
+            <a:r>
+              <a:rPr lang="sv-SE" sz="1200" kern="1200" dirty="0" err="1" smtClean="0">
+                <a:solidFill>
+                  <a:schemeClr val="tx1"/>
+                </a:solidFill>
+                <a:effectLst/>
+                <a:latin typeface="+mn-lt"/>
+                <a:ea typeface="+mn-ea"/>
+                <a:cs typeface="+mn-cs"/>
+              </a:rPr>
+              <a:t>är</a:t>
+            </a:r>
+            <a:r>
+              <a:rPr lang="sv-SE" sz="1200" kern="1200" dirty="0" smtClean="0">
+                <a:solidFill>
+                  <a:schemeClr val="tx1"/>
+                </a:solidFill>
+                <a:effectLst/>
+                <a:latin typeface="+mn-lt"/>
+                <a:ea typeface="+mn-ea"/>
+                <a:cs typeface="+mn-cs"/>
+              </a:rPr>
+              <a:t> standardavvikelsen. </a:t>
+            </a:r>
+          </a:p>
+          <a:p>
+            <a:pPr marL="0" indent="0">
+              <a:buNone/>
+            </a:pPr>
+            <a:endParaRPr lang="sv-SE" sz="1200" kern="1200" dirty="0" smtClean="0">
+              <a:solidFill>
+                <a:schemeClr val="tx1"/>
+              </a:solidFill>
+              <a:effectLst/>
+              <a:latin typeface="+mn-lt"/>
+              <a:ea typeface="+mn-ea"/>
+              <a:cs typeface="+mn-cs"/>
+            </a:endParaRPr>
+          </a:p>
+          <a:p>
+            <a:pPr marL="228600" indent="-228600">
+              <a:buAutoNum type="arabicParenR"/>
+            </a:pPr>
+            <a:r>
+              <a:rPr lang="sv-SE" sz="1200" kern="1200" dirty="0" smtClean="0">
+                <a:solidFill>
+                  <a:schemeClr val="tx1"/>
+                </a:solidFill>
+                <a:effectLst/>
+                <a:latin typeface="+mn-lt"/>
+                <a:ea typeface="+mn-ea"/>
+                <a:cs typeface="+mn-cs"/>
+              </a:rPr>
+              <a:t>Uppdelning av </a:t>
+            </a:r>
+            <a:r>
+              <a:rPr lang="sv-SE" sz="1200" kern="1200" dirty="0" err="1" smtClean="0">
+                <a:solidFill>
+                  <a:schemeClr val="tx1"/>
+                </a:solidFill>
+                <a:effectLst/>
+                <a:latin typeface="+mn-lt"/>
+                <a:ea typeface="+mn-ea"/>
+                <a:cs typeface="+mn-cs"/>
+              </a:rPr>
+              <a:t>poäng</a:t>
+            </a:r>
+            <a:r>
+              <a:rPr lang="sv-SE" sz="1200" kern="1200" dirty="0" smtClean="0">
+                <a:solidFill>
+                  <a:schemeClr val="tx1"/>
+                </a:solidFill>
+                <a:effectLst/>
+                <a:latin typeface="+mn-lt"/>
+                <a:ea typeface="+mn-ea"/>
+                <a:cs typeface="+mn-cs"/>
+              </a:rPr>
+              <a:t> </a:t>
+            </a:r>
+            <a:r>
+              <a:rPr lang="sv-SE" sz="1200" kern="1200" dirty="0" err="1" smtClean="0">
+                <a:solidFill>
+                  <a:schemeClr val="tx1"/>
+                </a:solidFill>
+                <a:effectLst/>
+                <a:latin typeface="+mn-lt"/>
+                <a:ea typeface="+mn-ea"/>
+                <a:cs typeface="+mn-cs"/>
+              </a:rPr>
+              <a:t>för</a:t>
+            </a:r>
+            <a:r>
+              <a:rPr lang="sv-SE" sz="1200" kern="1200" dirty="0" smtClean="0">
+                <a:solidFill>
+                  <a:schemeClr val="tx1"/>
+                </a:solidFill>
+                <a:effectLst/>
+                <a:latin typeface="+mn-lt"/>
+                <a:ea typeface="+mn-ea"/>
+                <a:cs typeface="+mn-cs"/>
+              </a:rPr>
+              <a:t> alla e-kurser </a:t>
+            </a:r>
+            <a:r>
+              <a:rPr lang="sv-SE" sz="1200" kern="1200" dirty="0" err="1" smtClean="0">
+                <a:solidFill>
+                  <a:schemeClr val="tx1"/>
+                </a:solidFill>
+                <a:effectLst/>
+                <a:latin typeface="+mn-lt"/>
+                <a:ea typeface="+mn-ea"/>
+                <a:cs typeface="+mn-cs"/>
+              </a:rPr>
+              <a:t>över</a:t>
+            </a:r>
+            <a:r>
+              <a:rPr lang="sv-SE" sz="1200" kern="1200" dirty="0" smtClean="0">
+                <a:solidFill>
+                  <a:schemeClr val="tx1"/>
+                </a:solidFill>
+                <a:effectLst/>
+                <a:latin typeface="+mn-lt"/>
+                <a:ea typeface="+mn-ea"/>
+                <a:cs typeface="+mn-cs"/>
+              </a:rPr>
+              <a:t> DIM’s olika faser, visade att </a:t>
+            </a:r>
+            <a:r>
+              <a:rPr lang="sv-SE" sz="1200" i="1" kern="1200" dirty="0" smtClean="0">
+                <a:solidFill>
+                  <a:schemeClr val="tx1"/>
+                </a:solidFill>
+                <a:effectLst/>
+                <a:latin typeface="+mn-lt"/>
+                <a:ea typeface="+mn-ea"/>
+                <a:cs typeface="+mn-cs"/>
+              </a:rPr>
+              <a:t>Presentations</a:t>
+            </a:r>
+            <a:r>
+              <a:rPr lang="sv-SE" sz="1200" kern="1200" dirty="0" smtClean="0">
+                <a:solidFill>
+                  <a:schemeClr val="tx1"/>
+                </a:solidFill>
+                <a:effectLst/>
+                <a:latin typeface="+mn-lt"/>
+                <a:ea typeface="+mn-ea"/>
+                <a:cs typeface="+mn-cs"/>
+              </a:rPr>
+              <a:t>-fasen samt </a:t>
+            </a:r>
+            <a:r>
+              <a:rPr lang="sv-SE" sz="1200" i="1" kern="1200" dirty="0" smtClean="0">
+                <a:solidFill>
+                  <a:schemeClr val="tx1"/>
+                </a:solidFill>
+                <a:effectLst/>
+                <a:latin typeface="+mn-lt"/>
+                <a:ea typeface="+mn-ea"/>
+                <a:cs typeface="+mn-cs"/>
+              </a:rPr>
+              <a:t>Praktik</a:t>
+            </a:r>
+            <a:r>
+              <a:rPr lang="sv-SE" sz="1200" kern="1200" dirty="0" smtClean="0">
+                <a:solidFill>
+                  <a:schemeClr val="tx1"/>
+                </a:solidFill>
+                <a:effectLst/>
+                <a:latin typeface="+mn-lt"/>
+                <a:ea typeface="+mn-ea"/>
+                <a:cs typeface="+mn-cs"/>
+              </a:rPr>
+              <a:t>-fasen hade relativt </a:t>
+            </a:r>
+            <a:r>
+              <a:rPr lang="sv-SE" sz="1200" kern="1200" dirty="0" err="1" smtClean="0">
+                <a:solidFill>
+                  <a:schemeClr val="tx1"/>
+                </a:solidFill>
+                <a:effectLst/>
+                <a:latin typeface="+mn-lt"/>
+                <a:ea typeface="+mn-ea"/>
+                <a:cs typeface="+mn-cs"/>
+              </a:rPr>
+              <a:t>höga</a:t>
+            </a:r>
+            <a:r>
+              <a:rPr lang="sv-SE" sz="1200" kern="1200" dirty="0" smtClean="0">
+                <a:solidFill>
+                  <a:schemeClr val="tx1"/>
+                </a:solidFill>
+                <a:effectLst/>
+                <a:latin typeface="+mn-lt"/>
+                <a:ea typeface="+mn-ea"/>
+                <a:cs typeface="+mn-cs"/>
+              </a:rPr>
+              <a:t> </a:t>
+            </a:r>
+            <a:r>
+              <a:rPr lang="sv-SE" sz="1200" kern="1200" dirty="0" err="1" smtClean="0">
+                <a:solidFill>
+                  <a:schemeClr val="tx1"/>
+                </a:solidFill>
+                <a:effectLst/>
+                <a:latin typeface="+mn-lt"/>
+                <a:ea typeface="+mn-ea"/>
+                <a:cs typeface="+mn-cs"/>
+              </a:rPr>
+              <a:t>poäng</a:t>
+            </a:r>
+            <a:r>
+              <a:rPr lang="sv-SE" sz="1200" kern="1200" dirty="0" smtClean="0">
+                <a:solidFill>
+                  <a:schemeClr val="tx1"/>
+                </a:solidFill>
+                <a:effectLst/>
+                <a:latin typeface="+mn-lt"/>
+                <a:ea typeface="+mn-ea"/>
+                <a:cs typeface="+mn-cs"/>
+              </a:rPr>
+              <a:t> (</a:t>
+            </a:r>
+            <a:r>
+              <a:rPr lang="sv-SE" sz="1200" kern="1200" dirty="0" err="1" smtClean="0">
+                <a:solidFill>
+                  <a:schemeClr val="tx1"/>
+                </a:solidFill>
+                <a:effectLst/>
+                <a:latin typeface="+mn-lt"/>
+                <a:ea typeface="+mn-ea"/>
+                <a:cs typeface="+mn-cs"/>
+              </a:rPr>
+              <a:t>medelpoäng</a:t>
+            </a:r>
+            <a:r>
+              <a:rPr lang="sv-SE" sz="1200" kern="1200" dirty="0" smtClean="0">
+                <a:solidFill>
+                  <a:schemeClr val="tx1"/>
+                </a:solidFill>
+                <a:effectLst/>
+                <a:latin typeface="+mn-lt"/>
+                <a:ea typeface="+mn-ea"/>
+                <a:cs typeface="+mn-cs"/>
+              </a:rPr>
+              <a:t> = 3,5 och 2,8) i kontrast till </a:t>
+            </a:r>
+            <a:r>
+              <a:rPr lang="sv-SE" sz="1200" i="1" kern="1200" dirty="0" err="1" smtClean="0">
+                <a:solidFill>
+                  <a:schemeClr val="tx1"/>
+                </a:solidFill>
+                <a:effectLst/>
+                <a:latin typeface="+mn-lt"/>
+                <a:ea typeface="+mn-ea"/>
+                <a:cs typeface="+mn-cs"/>
+              </a:rPr>
+              <a:t>Övervakning</a:t>
+            </a:r>
+            <a:r>
+              <a:rPr lang="sv-SE" sz="1200" i="1" kern="1200" dirty="0" smtClean="0">
+                <a:solidFill>
+                  <a:schemeClr val="tx1"/>
+                </a:solidFill>
+                <a:effectLst/>
+                <a:latin typeface="+mn-lt"/>
+                <a:ea typeface="+mn-ea"/>
+                <a:cs typeface="+mn-cs"/>
+              </a:rPr>
+              <a:t> och </a:t>
+            </a:r>
+            <a:r>
+              <a:rPr lang="sv-SE" sz="1200" i="1" kern="1200" dirty="0" err="1" smtClean="0">
+                <a:solidFill>
+                  <a:schemeClr val="tx1"/>
+                </a:solidFill>
+                <a:effectLst/>
+                <a:latin typeface="+mn-lt"/>
+                <a:ea typeface="+mn-ea"/>
+                <a:cs typeface="+mn-cs"/>
+              </a:rPr>
+              <a:t>Återkopplings</a:t>
+            </a:r>
+            <a:r>
+              <a:rPr lang="sv-SE" sz="1200" kern="1200" dirty="0" err="1" smtClean="0">
+                <a:solidFill>
+                  <a:schemeClr val="tx1"/>
+                </a:solidFill>
+                <a:effectLst/>
+                <a:latin typeface="+mn-lt"/>
+                <a:ea typeface="+mn-ea"/>
+                <a:cs typeface="+mn-cs"/>
+              </a:rPr>
+              <a:t>-fasen</a:t>
+            </a:r>
+            <a:r>
+              <a:rPr lang="sv-SE" sz="1200" kern="1200" dirty="0" smtClean="0">
+                <a:solidFill>
+                  <a:schemeClr val="tx1"/>
+                </a:solidFill>
+                <a:effectLst/>
+                <a:latin typeface="+mn-lt"/>
+                <a:ea typeface="+mn-ea"/>
+                <a:cs typeface="+mn-cs"/>
+              </a:rPr>
+              <a:t> och </a:t>
+            </a:r>
+            <a:r>
+              <a:rPr lang="sv-SE" sz="1200" i="1" kern="1200" dirty="0" err="1" smtClean="0">
+                <a:solidFill>
+                  <a:schemeClr val="tx1"/>
+                </a:solidFill>
+                <a:effectLst/>
+                <a:latin typeface="+mn-lt"/>
+                <a:ea typeface="+mn-ea"/>
+                <a:cs typeface="+mn-cs"/>
+              </a:rPr>
+              <a:t>Bedömning</a:t>
+            </a:r>
+            <a:r>
+              <a:rPr lang="sv-SE" sz="1200" i="1" kern="1200" dirty="0" smtClean="0">
+                <a:solidFill>
+                  <a:schemeClr val="tx1"/>
+                </a:solidFill>
+                <a:effectLst/>
+                <a:latin typeface="+mn-lt"/>
+                <a:ea typeface="+mn-ea"/>
+                <a:cs typeface="+mn-cs"/>
+              </a:rPr>
+              <a:t> och </a:t>
+            </a:r>
+            <a:r>
+              <a:rPr lang="sv-SE" sz="1200" i="1" kern="1200" dirty="0" err="1" smtClean="0">
+                <a:solidFill>
+                  <a:schemeClr val="tx1"/>
+                </a:solidFill>
+                <a:effectLst/>
+                <a:latin typeface="+mn-lt"/>
+                <a:ea typeface="+mn-ea"/>
+                <a:cs typeface="+mn-cs"/>
+              </a:rPr>
+              <a:t>Utvärderings</a:t>
+            </a:r>
+            <a:r>
+              <a:rPr lang="sv-SE" sz="1200" kern="1200" dirty="0" err="1" smtClean="0">
+                <a:solidFill>
+                  <a:schemeClr val="tx1"/>
+                </a:solidFill>
+                <a:effectLst/>
+                <a:latin typeface="+mn-lt"/>
+                <a:ea typeface="+mn-ea"/>
+                <a:cs typeface="+mn-cs"/>
+              </a:rPr>
+              <a:t>-fasen</a:t>
+            </a:r>
+            <a:r>
+              <a:rPr lang="sv-SE" sz="1200" kern="1200" dirty="0" smtClean="0">
+                <a:solidFill>
+                  <a:schemeClr val="tx1"/>
+                </a:solidFill>
+                <a:effectLst/>
+                <a:latin typeface="+mn-lt"/>
+                <a:ea typeface="+mn-ea"/>
+                <a:cs typeface="+mn-cs"/>
+              </a:rPr>
+              <a:t> som hade relativt </a:t>
+            </a:r>
+            <a:r>
+              <a:rPr lang="sv-SE" sz="1200" kern="1200" dirty="0" err="1" smtClean="0">
+                <a:solidFill>
+                  <a:schemeClr val="tx1"/>
+                </a:solidFill>
+                <a:effectLst/>
+                <a:latin typeface="+mn-lt"/>
+                <a:ea typeface="+mn-ea"/>
+                <a:cs typeface="+mn-cs"/>
+              </a:rPr>
+              <a:t>låga</a:t>
+            </a:r>
+            <a:r>
+              <a:rPr lang="sv-SE" sz="1200" kern="1200" dirty="0" smtClean="0">
+                <a:solidFill>
+                  <a:schemeClr val="tx1"/>
+                </a:solidFill>
+                <a:effectLst/>
+                <a:latin typeface="+mn-lt"/>
+                <a:ea typeface="+mn-ea"/>
+                <a:cs typeface="+mn-cs"/>
+              </a:rPr>
+              <a:t> </a:t>
+            </a:r>
+            <a:r>
+              <a:rPr lang="sv-SE" sz="1200" kern="1200" dirty="0" err="1" smtClean="0">
+                <a:solidFill>
+                  <a:schemeClr val="tx1"/>
+                </a:solidFill>
+                <a:effectLst/>
+                <a:latin typeface="+mn-lt"/>
+                <a:ea typeface="+mn-ea"/>
+                <a:cs typeface="+mn-cs"/>
+              </a:rPr>
+              <a:t>poäng</a:t>
+            </a:r>
+            <a:r>
+              <a:rPr lang="sv-SE" sz="1200" kern="1200" dirty="0" smtClean="0">
+                <a:solidFill>
+                  <a:schemeClr val="tx1"/>
+                </a:solidFill>
+                <a:effectLst/>
+                <a:latin typeface="+mn-lt"/>
+                <a:ea typeface="+mn-ea"/>
+                <a:cs typeface="+mn-cs"/>
+              </a:rPr>
+              <a:t> (</a:t>
+            </a:r>
+            <a:r>
+              <a:rPr lang="sv-SE" sz="1200" kern="1200" dirty="0" err="1" smtClean="0">
+                <a:solidFill>
+                  <a:schemeClr val="tx1"/>
+                </a:solidFill>
+                <a:effectLst/>
+                <a:latin typeface="+mn-lt"/>
+                <a:ea typeface="+mn-ea"/>
+                <a:cs typeface="+mn-cs"/>
+              </a:rPr>
+              <a:t>medelpoäng</a:t>
+            </a:r>
+            <a:r>
+              <a:rPr lang="sv-SE" sz="1200" kern="1200" dirty="0" smtClean="0">
+                <a:solidFill>
+                  <a:schemeClr val="tx1"/>
+                </a:solidFill>
+                <a:effectLst/>
+                <a:latin typeface="+mn-lt"/>
+                <a:ea typeface="+mn-ea"/>
+                <a:cs typeface="+mn-cs"/>
+              </a:rPr>
+              <a:t> = 2,2 och 1,5).</a:t>
+            </a:r>
+          </a:p>
+          <a:p>
+            <a:pPr marL="228600" indent="-228600">
+              <a:buAutoNum type="arabicParenR"/>
+            </a:pPr>
+            <a:endParaRPr lang="sv-SE" sz="1200" kern="1200" dirty="0" smtClean="0">
+              <a:solidFill>
+                <a:schemeClr val="tx1"/>
+              </a:solidFill>
+              <a:effectLst/>
+              <a:latin typeface="+mn-lt"/>
+              <a:ea typeface="+mn-ea"/>
+              <a:cs typeface="+mn-cs"/>
+            </a:endParaRPr>
+          </a:p>
+          <a:p>
+            <a:pPr marL="228600" indent="-228600">
+              <a:buAutoNum type="arabicParenR"/>
+            </a:pPr>
+            <a:r>
+              <a:rPr lang="sv-SE" sz="1200" kern="1200" dirty="0" smtClean="0">
+                <a:solidFill>
+                  <a:schemeClr val="tx1"/>
+                </a:solidFill>
+                <a:effectLst/>
+                <a:latin typeface="+mn-lt"/>
+                <a:ea typeface="+mn-ea"/>
+                <a:cs typeface="+mn-cs"/>
+              </a:rPr>
+              <a:t>Dessa resultat betecknar Grades </a:t>
+            </a:r>
+            <a:r>
+              <a:rPr lang="sv-SE" sz="1200" kern="1200" dirty="0" err="1" smtClean="0">
+                <a:solidFill>
+                  <a:schemeClr val="tx1"/>
+                </a:solidFill>
+                <a:effectLst/>
+                <a:latin typeface="+mn-lt"/>
+                <a:ea typeface="+mn-ea"/>
+                <a:cs typeface="+mn-cs"/>
+              </a:rPr>
+              <a:t>förmågor</a:t>
+            </a:r>
+            <a:r>
+              <a:rPr lang="sv-SE" sz="1200" kern="1200" dirty="0" smtClean="0">
+                <a:solidFill>
+                  <a:schemeClr val="tx1"/>
+                </a:solidFill>
+                <a:effectLst/>
+                <a:latin typeface="+mn-lt"/>
+                <a:ea typeface="+mn-ea"/>
+                <a:cs typeface="+mn-cs"/>
+              </a:rPr>
+              <a:t> att presentera information och meningen bakom kursen till studenterna och samtidigt </a:t>
+            </a:r>
+            <a:r>
+              <a:rPr lang="sv-SE" sz="1200" kern="1200" dirty="0" err="1" smtClean="0">
+                <a:solidFill>
+                  <a:schemeClr val="tx1"/>
+                </a:solidFill>
+                <a:effectLst/>
+                <a:latin typeface="+mn-lt"/>
+                <a:ea typeface="+mn-ea"/>
+                <a:cs typeface="+mn-cs"/>
+              </a:rPr>
+              <a:t>understödja</a:t>
+            </a:r>
+            <a:r>
+              <a:rPr lang="sv-SE" sz="1200" kern="1200" dirty="0" smtClean="0">
+                <a:solidFill>
+                  <a:schemeClr val="tx1"/>
+                </a:solidFill>
+                <a:effectLst/>
+                <a:latin typeface="+mn-lt"/>
+                <a:ea typeface="+mn-ea"/>
+                <a:cs typeface="+mn-cs"/>
+              </a:rPr>
+              <a:t> deras </a:t>
+            </a:r>
+            <a:r>
+              <a:rPr lang="sv-SE" sz="1200" kern="1200" dirty="0" err="1" smtClean="0">
+                <a:solidFill>
+                  <a:schemeClr val="tx1"/>
+                </a:solidFill>
+                <a:effectLst/>
+                <a:latin typeface="+mn-lt"/>
+                <a:ea typeface="+mn-ea"/>
+                <a:cs typeface="+mn-cs"/>
+              </a:rPr>
+              <a:t>lärande</a:t>
+            </a:r>
+            <a:r>
+              <a:rPr lang="sv-SE" sz="1200" kern="1200" dirty="0" smtClean="0">
+                <a:solidFill>
+                  <a:schemeClr val="tx1"/>
+                </a:solidFill>
+                <a:effectLst/>
+                <a:latin typeface="+mn-lt"/>
+                <a:ea typeface="+mn-ea"/>
+                <a:cs typeface="+mn-cs"/>
+              </a:rPr>
+              <a:t> genom sammanfattningar av materialet och </a:t>
+            </a:r>
+            <a:r>
+              <a:rPr lang="sv-SE" sz="1200" kern="1200" dirty="0" err="1" smtClean="0">
+                <a:solidFill>
+                  <a:schemeClr val="tx1"/>
+                </a:solidFill>
+                <a:effectLst/>
+                <a:latin typeface="+mn-lt"/>
+                <a:ea typeface="+mn-ea"/>
+                <a:cs typeface="+mn-cs"/>
+              </a:rPr>
+              <a:t>övningar</a:t>
+            </a:r>
+            <a:r>
+              <a:rPr lang="sv-SE" sz="1200" kern="1200" dirty="0" smtClean="0">
+                <a:solidFill>
+                  <a:schemeClr val="tx1"/>
+                </a:solidFill>
+                <a:effectLst/>
+                <a:latin typeface="+mn-lt"/>
+                <a:ea typeface="+mn-ea"/>
+                <a:cs typeface="+mn-cs"/>
+              </a:rPr>
+              <a:t>. Samtidigt visar resultatet generellt sett att Grade kunde </a:t>
+            </a:r>
+            <a:r>
+              <a:rPr lang="sv-SE" sz="1200" kern="1200" dirty="0" err="1" smtClean="0">
+                <a:solidFill>
+                  <a:schemeClr val="tx1"/>
+                </a:solidFill>
+                <a:effectLst/>
+                <a:latin typeface="+mn-lt"/>
+                <a:ea typeface="+mn-ea"/>
+                <a:cs typeface="+mn-cs"/>
+              </a:rPr>
+              <a:t>förbättra</a:t>
+            </a:r>
+            <a:r>
+              <a:rPr lang="sv-SE" sz="1200" kern="1200" dirty="0" smtClean="0">
+                <a:solidFill>
+                  <a:schemeClr val="tx1"/>
+                </a:solidFill>
+                <a:effectLst/>
+                <a:latin typeface="+mn-lt"/>
+                <a:ea typeface="+mn-ea"/>
+                <a:cs typeface="+mn-cs"/>
+              </a:rPr>
+              <a:t> kurserna genom att </a:t>
+            </a:r>
+            <a:r>
+              <a:rPr lang="sv-SE" sz="1200" kern="1200" dirty="0" err="1" smtClean="0">
+                <a:solidFill>
+                  <a:schemeClr val="tx1"/>
+                </a:solidFill>
+                <a:effectLst/>
+                <a:latin typeface="+mn-lt"/>
+                <a:ea typeface="+mn-ea"/>
+                <a:cs typeface="+mn-cs"/>
+              </a:rPr>
+              <a:t>lägga</a:t>
+            </a:r>
+            <a:r>
+              <a:rPr lang="sv-SE" sz="1200" kern="1200" dirty="0" smtClean="0">
+                <a:solidFill>
+                  <a:schemeClr val="tx1"/>
+                </a:solidFill>
+                <a:effectLst/>
+                <a:latin typeface="+mn-lt"/>
+                <a:ea typeface="+mn-ea"/>
+                <a:cs typeface="+mn-cs"/>
+              </a:rPr>
+              <a:t> mer fokus </a:t>
+            </a:r>
+            <a:r>
+              <a:rPr lang="sv-SE" sz="1200" kern="1200" dirty="0" err="1" smtClean="0">
+                <a:solidFill>
+                  <a:schemeClr val="tx1"/>
+                </a:solidFill>
+                <a:effectLst/>
+                <a:latin typeface="+mn-lt"/>
+                <a:ea typeface="+mn-ea"/>
+                <a:cs typeface="+mn-cs"/>
+              </a:rPr>
+              <a:t>pa</a:t>
+            </a:r>
+            <a:r>
+              <a:rPr lang="sv-SE" sz="1200" kern="1200" dirty="0" smtClean="0">
+                <a:solidFill>
+                  <a:schemeClr val="tx1"/>
+                </a:solidFill>
+                <a:effectLst/>
+                <a:latin typeface="+mn-lt"/>
+                <a:ea typeface="+mn-ea"/>
+                <a:cs typeface="+mn-cs"/>
+              </a:rPr>
+              <a:t>̊ feedback, </a:t>
+            </a:r>
+            <a:r>
+              <a:rPr lang="sv-SE" sz="1200" kern="1200" dirty="0" err="1" smtClean="0">
+                <a:solidFill>
+                  <a:schemeClr val="tx1"/>
+                </a:solidFill>
+                <a:effectLst/>
+                <a:latin typeface="+mn-lt"/>
+                <a:ea typeface="+mn-ea"/>
+                <a:cs typeface="+mn-cs"/>
+              </a:rPr>
+              <a:t>avslutningstest</a:t>
+            </a:r>
+            <a:r>
+              <a:rPr lang="sv-SE" sz="1200" kern="1200" dirty="0" smtClean="0">
+                <a:solidFill>
+                  <a:schemeClr val="tx1"/>
+                </a:solidFill>
+                <a:effectLst/>
+                <a:latin typeface="+mn-lt"/>
+                <a:ea typeface="+mn-ea"/>
+                <a:cs typeface="+mn-cs"/>
+              </a:rPr>
+              <a:t>, och </a:t>
+            </a:r>
+            <a:r>
+              <a:rPr lang="sv-SE" sz="1200" kern="1200" dirty="0" err="1" smtClean="0">
+                <a:solidFill>
+                  <a:schemeClr val="tx1"/>
+                </a:solidFill>
+                <a:effectLst/>
+                <a:latin typeface="+mn-lt"/>
+                <a:ea typeface="+mn-ea"/>
+                <a:cs typeface="+mn-cs"/>
+              </a:rPr>
+              <a:t>rättningar</a:t>
+            </a:r>
+            <a:r>
+              <a:rPr lang="sv-SE" sz="1200" kern="1200" dirty="0" smtClean="0">
+                <a:solidFill>
+                  <a:schemeClr val="tx1"/>
+                </a:solidFill>
+                <a:effectLst/>
+                <a:latin typeface="+mn-lt"/>
+                <a:ea typeface="+mn-ea"/>
+                <a:cs typeface="+mn-cs"/>
+              </a:rPr>
+              <a:t>. </a:t>
+            </a:r>
+            <a:endParaRPr lang="sv-SE" dirty="0" smtClean="0">
+              <a:effectLst/>
+            </a:endParaRPr>
+          </a:p>
+          <a:p>
+            <a:pPr marL="228600" indent="-228600">
+              <a:buAutoNum type="arabicParenR"/>
+            </a:pPr>
+            <a:endParaRPr lang="sv-SE" dirty="0" smtClean="0">
+              <a:effectLst/>
+            </a:endParaRPr>
+          </a:p>
+          <a:p>
+            <a:pPr marL="228600" indent="-228600">
+              <a:buAutoNum type="arabicParenR"/>
+            </a:pPr>
+            <a:endParaRPr lang="sv-SE" dirty="0" smtClean="0"/>
+          </a:p>
+          <a:p>
+            <a:pPr marL="0" marR="0" indent="0" algn="l" defTabSz="457200" rtl="0" eaLnBrk="1" fontAlgn="auto" latinLnBrk="0" hangingPunct="1">
+              <a:lnSpc>
+                <a:spcPct val="100000"/>
+              </a:lnSpc>
+              <a:spcBef>
+                <a:spcPts val="0"/>
+              </a:spcBef>
+              <a:spcAft>
+                <a:spcPts val="0"/>
+              </a:spcAft>
+              <a:buClrTx/>
+              <a:buSzTx/>
+              <a:buFontTx/>
+              <a:buNone/>
+              <a:tabLst/>
+              <a:defRPr/>
+            </a:pPr>
+            <a:endParaRPr lang="sv-SE" dirty="0" smtClean="0"/>
+          </a:p>
+          <a:p>
             <a:pPr marL="0" marR="0" indent="0" algn="l" defTabSz="457200" rtl="0" eaLnBrk="1" fontAlgn="auto" latinLnBrk="0" hangingPunct="1">
               <a:lnSpc>
                 <a:spcPct val="100000"/>
@@ -1047,9 +1958,1660 @@
           <a:bodyPr/>
           <a:lstStyle/>
           <a:p>
+            <a:pPr marL="228600" indent="-228600">
+              <a:buAutoNum type="arabicParenR"/>
+            </a:pPr>
+            <a:r>
+              <a:rPr lang="sv-SE" sz="1200" kern="1200" dirty="0" smtClean="0">
+                <a:solidFill>
+                  <a:schemeClr val="tx1"/>
+                </a:solidFill>
+                <a:effectLst/>
+                <a:latin typeface="+mn-lt"/>
+                <a:ea typeface="+mn-ea"/>
+                <a:cs typeface="+mn-cs"/>
+              </a:rPr>
+              <a:t>DIM faser och element presenteras med tilldelade </a:t>
+            </a:r>
+            <a:r>
+              <a:rPr lang="sv-SE" sz="1200" kern="1200" dirty="0" err="1" smtClean="0">
+                <a:solidFill>
+                  <a:schemeClr val="tx1"/>
+                </a:solidFill>
+                <a:effectLst/>
+                <a:latin typeface="+mn-lt"/>
+                <a:ea typeface="+mn-ea"/>
+                <a:cs typeface="+mn-cs"/>
+              </a:rPr>
+              <a:t>poäng</a:t>
+            </a:r>
+            <a:r>
+              <a:rPr lang="sv-SE" sz="1200" kern="1200" dirty="0" smtClean="0">
+                <a:solidFill>
+                  <a:schemeClr val="tx1"/>
+                </a:solidFill>
+                <a:effectLst/>
+                <a:latin typeface="+mn-lt"/>
+                <a:ea typeface="+mn-ea"/>
+                <a:cs typeface="+mn-cs"/>
+              </a:rPr>
+              <a:t>, den </a:t>
+            </a:r>
+            <a:r>
+              <a:rPr lang="sv-SE" sz="1200" kern="1200" dirty="0" err="1" smtClean="0">
+                <a:solidFill>
+                  <a:schemeClr val="tx1"/>
+                </a:solidFill>
+                <a:effectLst/>
+                <a:latin typeface="+mn-lt"/>
+                <a:ea typeface="+mn-ea"/>
+                <a:cs typeface="+mn-cs"/>
+              </a:rPr>
+              <a:t>vågräta</a:t>
+            </a:r>
+            <a:r>
+              <a:rPr lang="sv-SE" sz="1200" kern="1200" dirty="0" smtClean="0">
+                <a:solidFill>
+                  <a:schemeClr val="tx1"/>
+                </a:solidFill>
+                <a:effectLst/>
+                <a:latin typeface="+mn-lt"/>
+                <a:ea typeface="+mn-ea"/>
+                <a:cs typeface="+mn-cs"/>
+              </a:rPr>
+              <a:t> linjen </a:t>
+            </a:r>
+            <a:r>
+              <a:rPr lang="sv-SE" sz="1200" kern="1200" dirty="0" err="1" smtClean="0">
+                <a:solidFill>
+                  <a:schemeClr val="tx1"/>
+                </a:solidFill>
+                <a:effectLst/>
+                <a:latin typeface="+mn-lt"/>
+                <a:ea typeface="+mn-ea"/>
+                <a:cs typeface="+mn-cs"/>
+              </a:rPr>
+              <a:t>är</a:t>
+            </a:r>
+            <a:r>
+              <a:rPr lang="sv-SE" sz="1200" kern="1200" dirty="0" smtClean="0">
+                <a:solidFill>
+                  <a:schemeClr val="tx1"/>
+                </a:solidFill>
+                <a:effectLst/>
+                <a:latin typeface="+mn-lt"/>
+                <a:ea typeface="+mn-ea"/>
+                <a:cs typeface="+mn-cs"/>
+              </a:rPr>
+              <a:t> </a:t>
+            </a:r>
+            <a:r>
+              <a:rPr lang="sv-SE" sz="1200" kern="1200" dirty="0" err="1" smtClean="0">
+                <a:solidFill>
+                  <a:schemeClr val="tx1"/>
+                </a:solidFill>
+                <a:effectLst/>
+                <a:latin typeface="+mn-lt"/>
+                <a:ea typeface="+mn-ea"/>
+                <a:cs typeface="+mn-cs"/>
+              </a:rPr>
+              <a:t>medelvärdet</a:t>
+            </a:r>
+            <a:r>
+              <a:rPr lang="sv-SE" sz="1200" kern="1200" dirty="0" smtClean="0">
+                <a:solidFill>
+                  <a:schemeClr val="tx1"/>
+                </a:solidFill>
+                <a:effectLst/>
+                <a:latin typeface="+mn-lt"/>
+                <a:ea typeface="+mn-ea"/>
+                <a:cs typeface="+mn-cs"/>
+              </a:rPr>
+              <a:t>, och den vertikala linjen </a:t>
+            </a:r>
+            <a:r>
+              <a:rPr lang="sv-SE" sz="1200" kern="1200" dirty="0" err="1" smtClean="0">
+                <a:solidFill>
+                  <a:schemeClr val="tx1"/>
+                </a:solidFill>
+                <a:effectLst/>
+                <a:latin typeface="+mn-lt"/>
+                <a:ea typeface="+mn-ea"/>
+                <a:cs typeface="+mn-cs"/>
+              </a:rPr>
+              <a:t>är</a:t>
+            </a:r>
+            <a:r>
+              <a:rPr lang="sv-SE" sz="1200" kern="1200" dirty="0" smtClean="0">
+                <a:solidFill>
+                  <a:schemeClr val="tx1"/>
+                </a:solidFill>
+                <a:effectLst/>
+                <a:latin typeface="+mn-lt"/>
+                <a:ea typeface="+mn-ea"/>
+                <a:cs typeface="+mn-cs"/>
+              </a:rPr>
+              <a:t> standardavvikelsen. </a:t>
+            </a:r>
+            <a:r>
+              <a:rPr lang="sv-SE" sz="1200" kern="1200" dirty="0" err="1" smtClean="0">
+                <a:solidFill>
+                  <a:schemeClr val="tx1"/>
+                </a:solidFill>
+                <a:effectLst/>
+                <a:latin typeface="+mn-lt"/>
+                <a:ea typeface="+mn-ea"/>
+                <a:cs typeface="+mn-cs"/>
+              </a:rPr>
+              <a:t>Inlärning</a:t>
+            </a:r>
+            <a:r>
+              <a:rPr lang="sv-SE" sz="1200" kern="1200" dirty="0" smtClean="0">
+                <a:solidFill>
+                  <a:schemeClr val="tx1"/>
+                </a:solidFill>
+                <a:effectLst/>
+                <a:latin typeface="+mn-lt"/>
+                <a:ea typeface="+mn-ea"/>
+                <a:cs typeface="+mn-cs"/>
+              </a:rPr>
+              <a:t> av specifik kunskap eller </a:t>
+            </a:r>
+            <a:r>
+              <a:rPr lang="sv-SE" sz="1200" kern="1200" dirty="0" err="1" smtClean="0">
+                <a:solidFill>
+                  <a:schemeClr val="tx1"/>
+                </a:solidFill>
+                <a:effectLst/>
+                <a:latin typeface="+mn-lt"/>
+                <a:ea typeface="+mn-ea"/>
+                <a:cs typeface="+mn-cs"/>
+              </a:rPr>
+              <a:t>färdighet</a:t>
+            </a:r>
+            <a:r>
+              <a:rPr lang="sv-SE" sz="1200" kern="1200" dirty="0" smtClean="0">
+                <a:solidFill>
+                  <a:schemeClr val="tx1"/>
+                </a:solidFill>
+                <a:effectLst/>
+                <a:latin typeface="+mn-lt"/>
+                <a:ea typeface="+mn-ea"/>
+                <a:cs typeface="+mn-cs"/>
+              </a:rPr>
+              <a:t> (ISKF), </a:t>
+            </a:r>
+            <a:r>
+              <a:rPr lang="sv-SE" sz="1200" kern="1200" dirty="0" err="1" smtClean="0">
+                <a:solidFill>
+                  <a:schemeClr val="tx1"/>
+                </a:solidFill>
+                <a:effectLst/>
+                <a:latin typeface="+mn-lt"/>
+                <a:ea typeface="+mn-ea"/>
+                <a:cs typeface="+mn-cs"/>
+              </a:rPr>
+              <a:t>Förklaring</a:t>
+            </a:r>
+            <a:r>
+              <a:rPr lang="sv-SE" sz="1200" kern="1200" dirty="0" smtClean="0">
+                <a:solidFill>
+                  <a:schemeClr val="tx1"/>
+                </a:solidFill>
+                <a:effectLst/>
+                <a:latin typeface="+mn-lt"/>
+                <a:ea typeface="+mn-ea"/>
+                <a:cs typeface="+mn-cs"/>
+              </a:rPr>
+              <a:t> till vad som ska </a:t>
+            </a:r>
+            <a:r>
+              <a:rPr lang="sv-SE" sz="1200" kern="1200" dirty="0" err="1" smtClean="0">
+                <a:solidFill>
+                  <a:schemeClr val="tx1"/>
+                </a:solidFill>
+                <a:effectLst/>
+                <a:latin typeface="+mn-lt"/>
+                <a:ea typeface="+mn-ea"/>
+                <a:cs typeface="+mn-cs"/>
+              </a:rPr>
+              <a:t>läras</a:t>
+            </a:r>
+            <a:r>
+              <a:rPr lang="sv-SE" sz="1200" kern="1200" dirty="0" smtClean="0">
+                <a:solidFill>
+                  <a:schemeClr val="tx1"/>
+                </a:solidFill>
+                <a:effectLst/>
+                <a:latin typeface="+mn-lt"/>
+                <a:ea typeface="+mn-ea"/>
+                <a:cs typeface="+mn-cs"/>
+              </a:rPr>
+              <a:t> (FTL). </a:t>
+            </a:r>
+          </a:p>
+          <a:p>
+            <a:pPr marL="0" indent="0">
+              <a:buNone/>
+            </a:pPr>
+            <a:endParaRPr lang="sv-SE" dirty="0" smtClean="0">
+              <a:effectLst/>
+            </a:endParaRPr>
+          </a:p>
+          <a:p>
+            <a:r>
+              <a:rPr lang="sv-SE" dirty="0" smtClean="0"/>
+              <a:t>2) - </a:t>
+            </a:r>
+            <a:r>
+              <a:rPr lang="sv-SE" sz="1200" kern="1200" dirty="0" smtClean="0">
+                <a:solidFill>
+                  <a:schemeClr val="tx1"/>
+                </a:solidFill>
+                <a:effectLst/>
+                <a:latin typeface="+mn-lt"/>
+                <a:ea typeface="+mn-ea"/>
+                <a:cs typeface="+mn-cs"/>
+              </a:rPr>
+              <a:t>I </a:t>
+            </a:r>
+            <a:r>
+              <a:rPr lang="sv-SE" sz="1200" i="1" kern="1200" dirty="0" smtClean="0">
+                <a:solidFill>
+                  <a:schemeClr val="tx1"/>
+                </a:solidFill>
+                <a:effectLst/>
+                <a:latin typeface="+mn-lt"/>
+                <a:ea typeface="+mn-ea"/>
+                <a:cs typeface="+mn-cs"/>
+              </a:rPr>
+              <a:t>Presentations</a:t>
+            </a:r>
+            <a:r>
+              <a:rPr lang="sv-SE" sz="1200" kern="1200" dirty="0" smtClean="0">
+                <a:solidFill>
+                  <a:schemeClr val="tx1"/>
+                </a:solidFill>
+                <a:effectLst/>
+                <a:latin typeface="+mn-lt"/>
+                <a:ea typeface="+mn-ea"/>
+                <a:cs typeface="+mn-cs"/>
+              </a:rPr>
+              <a:t>-fasen visade elementet </a:t>
+            </a:r>
+            <a:r>
+              <a:rPr lang="sv-SE" sz="1200" i="1" kern="1200" dirty="0" err="1" smtClean="0">
+                <a:solidFill>
+                  <a:schemeClr val="tx1"/>
+                </a:solidFill>
+                <a:effectLst/>
+                <a:latin typeface="+mn-lt"/>
+                <a:ea typeface="+mn-ea"/>
+                <a:cs typeface="+mn-cs"/>
+              </a:rPr>
+              <a:t>Förståelse</a:t>
+            </a:r>
+            <a:r>
+              <a:rPr lang="sv-SE" sz="1200" i="1" kern="1200" dirty="0" smtClean="0">
+                <a:solidFill>
+                  <a:schemeClr val="tx1"/>
+                </a:solidFill>
+                <a:effectLst/>
+                <a:latin typeface="+mn-lt"/>
+                <a:ea typeface="+mn-ea"/>
+                <a:cs typeface="+mn-cs"/>
+              </a:rPr>
+              <a:t> </a:t>
+            </a:r>
+            <a:r>
+              <a:rPr lang="sv-SE" sz="1200" kern="1200" dirty="0" smtClean="0">
+                <a:solidFill>
+                  <a:schemeClr val="tx1"/>
+                </a:solidFill>
+                <a:effectLst/>
+                <a:latin typeface="+mn-lt"/>
+                <a:ea typeface="+mn-ea"/>
+                <a:cs typeface="+mn-cs"/>
+              </a:rPr>
+              <a:t>en </a:t>
+            </a:r>
+            <a:r>
+              <a:rPr lang="sv-SE" sz="1200" kern="1200" dirty="0" err="1" smtClean="0">
+                <a:solidFill>
+                  <a:schemeClr val="tx1"/>
+                </a:solidFill>
+                <a:effectLst/>
+                <a:latin typeface="+mn-lt"/>
+                <a:ea typeface="+mn-ea"/>
+                <a:cs typeface="+mn-cs"/>
+              </a:rPr>
+              <a:t>låg</a:t>
+            </a:r>
+            <a:r>
+              <a:rPr lang="sv-SE" sz="1200" kern="1200" dirty="0" smtClean="0">
+                <a:solidFill>
+                  <a:schemeClr val="tx1"/>
+                </a:solidFill>
+                <a:effectLst/>
+                <a:latin typeface="+mn-lt"/>
+                <a:ea typeface="+mn-ea"/>
+                <a:cs typeface="+mn-cs"/>
+              </a:rPr>
+              <a:t> </a:t>
+            </a:r>
+            <a:r>
+              <a:rPr lang="sv-SE" sz="1200" kern="1200" dirty="0" err="1" smtClean="0">
+                <a:solidFill>
+                  <a:schemeClr val="tx1"/>
+                </a:solidFill>
+                <a:effectLst/>
+                <a:latin typeface="+mn-lt"/>
+                <a:ea typeface="+mn-ea"/>
+                <a:cs typeface="+mn-cs"/>
+              </a:rPr>
+              <a:t>poäng</a:t>
+            </a:r>
+            <a:r>
+              <a:rPr lang="sv-SE" sz="1200" kern="1200" dirty="0" smtClean="0">
+                <a:solidFill>
+                  <a:schemeClr val="tx1"/>
+                </a:solidFill>
+                <a:effectLst/>
+                <a:latin typeface="+mn-lt"/>
+                <a:ea typeface="+mn-ea"/>
+                <a:cs typeface="+mn-cs"/>
+              </a:rPr>
+              <a:t> (</a:t>
+            </a:r>
+            <a:r>
+              <a:rPr lang="sv-SE" sz="1200" kern="1200" dirty="0" err="1" smtClean="0">
+                <a:solidFill>
+                  <a:schemeClr val="tx1"/>
+                </a:solidFill>
+                <a:effectLst/>
+                <a:latin typeface="+mn-lt"/>
+                <a:ea typeface="+mn-ea"/>
+                <a:cs typeface="+mn-cs"/>
+              </a:rPr>
+              <a:t>medelpoäng</a:t>
+            </a:r>
+            <a:r>
+              <a:rPr lang="sv-SE" sz="1200" kern="1200" dirty="0" smtClean="0">
+                <a:solidFill>
+                  <a:schemeClr val="tx1"/>
+                </a:solidFill>
+                <a:effectLst/>
+                <a:latin typeface="+mn-lt"/>
+                <a:ea typeface="+mn-ea"/>
+                <a:cs typeface="+mn-cs"/>
+              </a:rPr>
+              <a:t> = 1,5) </a:t>
+            </a:r>
+            <a:r>
+              <a:rPr lang="sv-SE" sz="1200" kern="1200" dirty="0" err="1" smtClean="0">
+                <a:solidFill>
+                  <a:schemeClr val="tx1"/>
+                </a:solidFill>
+                <a:effectLst/>
+                <a:latin typeface="+mn-lt"/>
+                <a:ea typeface="+mn-ea"/>
+                <a:cs typeface="+mn-cs"/>
+              </a:rPr>
+              <a:t>jämfört</a:t>
+            </a:r>
+            <a:r>
+              <a:rPr lang="sv-SE" sz="1200" kern="1200" dirty="0" smtClean="0">
+                <a:solidFill>
+                  <a:schemeClr val="tx1"/>
+                </a:solidFill>
+                <a:effectLst/>
+                <a:latin typeface="+mn-lt"/>
+                <a:ea typeface="+mn-ea"/>
+                <a:cs typeface="+mn-cs"/>
+              </a:rPr>
+              <a:t> med resten av elementen i fasen som hade relativt </a:t>
+            </a:r>
+            <a:r>
+              <a:rPr lang="sv-SE" sz="1200" kern="1200" dirty="0" err="1" smtClean="0">
+                <a:solidFill>
+                  <a:schemeClr val="tx1"/>
+                </a:solidFill>
+                <a:effectLst/>
+                <a:latin typeface="+mn-lt"/>
+                <a:ea typeface="+mn-ea"/>
+                <a:cs typeface="+mn-cs"/>
+              </a:rPr>
+              <a:t>hög</a:t>
+            </a:r>
+            <a:r>
+              <a:rPr lang="sv-SE" sz="1200" kern="1200" dirty="0" smtClean="0">
+                <a:solidFill>
+                  <a:schemeClr val="tx1"/>
+                </a:solidFill>
+                <a:effectLst/>
+                <a:latin typeface="+mn-lt"/>
+                <a:ea typeface="+mn-ea"/>
+                <a:cs typeface="+mn-cs"/>
+              </a:rPr>
+              <a:t> </a:t>
+            </a:r>
+            <a:r>
+              <a:rPr lang="sv-SE" sz="1200" kern="1200" dirty="0" err="1" smtClean="0">
+                <a:solidFill>
+                  <a:schemeClr val="tx1"/>
+                </a:solidFill>
+                <a:effectLst/>
+                <a:latin typeface="+mn-lt"/>
+                <a:ea typeface="+mn-ea"/>
+                <a:cs typeface="+mn-cs"/>
+              </a:rPr>
+              <a:t>medelpoäng</a:t>
+            </a:r>
+            <a:r>
+              <a:rPr lang="sv-SE" sz="1200" kern="1200" dirty="0" smtClean="0">
+                <a:solidFill>
+                  <a:schemeClr val="tx1"/>
+                </a:solidFill>
+                <a:effectLst/>
+                <a:latin typeface="+mn-lt"/>
+                <a:ea typeface="+mn-ea"/>
+                <a:cs typeface="+mn-cs"/>
+              </a:rPr>
+              <a:t> (</a:t>
+            </a:r>
+            <a:r>
+              <a:rPr lang="sv-SE" sz="1200" kern="1200" dirty="0" err="1" smtClean="0">
+                <a:solidFill>
+                  <a:schemeClr val="tx1"/>
+                </a:solidFill>
+                <a:effectLst/>
+                <a:latin typeface="+mn-lt"/>
+                <a:ea typeface="+mn-ea"/>
+                <a:cs typeface="+mn-cs"/>
+              </a:rPr>
+              <a:t>medelpoäng</a:t>
+            </a:r>
+            <a:r>
+              <a:rPr lang="sv-SE" sz="1200" kern="1200" dirty="0" smtClean="0">
+                <a:solidFill>
+                  <a:schemeClr val="tx1"/>
+                </a:solidFill>
+                <a:effectLst/>
+                <a:latin typeface="+mn-lt"/>
+                <a:ea typeface="+mn-ea"/>
+                <a:cs typeface="+mn-cs"/>
+              </a:rPr>
+              <a:t> = 3,8, 4,4, och 	4,8; Figur 3b). </a:t>
+            </a:r>
+          </a:p>
+          <a:p>
+            <a:endParaRPr lang="sv-SE" sz="1200" kern="1200" dirty="0" smtClean="0">
+              <a:solidFill>
+                <a:schemeClr val="tx1"/>
+              </a:solidFill>
+              <a:effectLst/>
+              <a:latin typeface="+mn-lt"/>
+              <a:ea typeface="+mn-ea"/>
+              <a:cs typeface="+mn-cs"/>
+            </a:endParaRPr>
+          </a:p>
+          <a:p>
+            <a:r>
+              <a:rPr lang="sv-SE" sz="1200" kern="1200" dirty="0" smtClean="0">
+                <a:solidFill>
+                  <a:schemeClr val="tx1"/>
+                </a:solidFill>
+                <a:effectLst/>
+                <a:latin typeface="+mn-lt"/>
+                <a:ea typeface="+mn-ea"/>
+                <a:cs typeface="+mn-cs"/>
+              </a:rPr>
+              <a:t>- Praktikfasen visade att elementet </a:t>
+            </a:r>
+            <a:r>
+              <a:rPr lang="sv-SE" sz="1200" i="1" kern="1200" dirty="0" err="1" smtClean="0">
+                <a:solidFill>
+                  <a:schemeClr val="tx1"/>
+                </a:solidFill>
+                <a:effectLst/>
+                <a:latin typeface="+mn-lt"/>
+                <a:ea typeface="+mn-ea"/>
+                <a:cs typeface="+mn-cs"/>
+              </a:rPr>
+              <a:t>Självständiga</a:t>
+            </a:r>
+            <a:r>
+              <a:rPr lang="sv-SE" sz="1200" i="1" kern="1200" dirty="0" smtClean="0">
+                <a:solidFill>
+                  <a:schemeClr val="tx1"/>
+                </a:solidFill>
+                <a:effectLst/>
+                <a:latin typeface="+mn-lt"/>
+                <a:ea typeface="+mn-ea"/>
+                <a:cs typeface="+mn-cs"/>
+              </a:rPr>
+              <a:t> </a:t>
+            </a:r>
+            <a:r>
+              <a:rPr lang="sv-SE" sz="1200" i="1" kern="1200" dirty="0" err="1" smtClean="0">
+                <a:solidFill>
+                  <a:schemeClr val="tx1"/>
+                </a:solidFill>
+                <a:effectLst/>
+                <a:latin typeface="+mn-lt"/>
+                <a:ea typeface="+mn-ea"/>
+                <a:cs typeface="+mn-cs"/>
+              </a:rPr>
+              <a:t>övningar</a:t>
+            </a:r>
+            <a:r>
+              <a:rPr lang="sv-SE" sz="1200" i="1" kern="1200" dirty="0" smtClean="0">
+                <a:solidFill>
+                  <a:schemeClr val="tx1"/>
+                </a:solidFill>
+                <a:effectLst/>
+                <a:latin typeface="+mn-lt"/>
+                <a:ea typeface="+mn-ea"/>
+                <a:cs typeface="+mn-cs"/>
+              </a:rPr>
+              <a:t> </a:t>
+            </a:r>
+            <a:r>
+              <a:rPr lang="sv-SE" sz="1200" kern="1200" dirty="0" smtClean="0">
+                <a:solidFill>
+                  <a:schemeClr val="tx1"/>
+                </a:solidFill>
+                <a:effectLst/>
+                <a:latin typeface="+mn-lt"/>
+                <a:ea typeface="+mn-ea"/>
+                <a:cs typeface="+mn-cs"/>
+              </a:rPr>
+              <a:t>och </a:t>
+            </a:r>
+            <a:r>
+              <a:rPr lang="sv-SE" sz="1200" i="1" kern="1200" dirty="0" smtClean="0">
+                <a:solidFill>
+                  <a:schemeClr val="tx1"/>
+                </a:solidFill>
+                <a:effectLst/>
+                <a:latin typeface="+mn-lt"/>
+                <a:ea typeface="+mn-ea"/>
+                <a:cs typeface="+mn-cs"/>
+              </a:rPr>
+              <a:t>Periodisk </a:t>
+            </a:r>
+            <a:r>
+              <a:rPr lang="sv-SE" sz="1200" i="1" kern="1200" dirty="0" err="1" smtClean="0">
+                <a:solidFill>
+                  <a:schemeClr val="tx1"/>
+                </a:solidFill>
+                <a:effectLst/>
+                <a:latin typeface="+mn-lt"/>
+                <a:ea typeface="+mn-ea"/>
+                <a:cs typeface="+mn-cs"/>
+              </a:rPr>
+              <a:t>Övervakning</a:t>
+            </a:r>
+            <a:r>
+              <a:rPr lang="sv-SE" sz="1200" i="1" kern="1200" dirty="0" smtClean="0">
+                <a:solidFill>
+                  <a:schemeClr val="tx1"/>
+                </a:solidFill>
+                <a:effectLst/>
+                <a:latin typeface="+mn-lt"/>
+                <a:ea typeface="+mn-ea"/>
+                <a:cs typeface="+mn-cs"/>
+              </a:rPr>
+              <a:t> </a:t>
+            </a:r>
+            <a:r>
+              <a:rPr lang="sv-SE" sz="1200" kern="1200" dirty="0" smtClean="0">
+                <a:solidFill>
+                  <a:schemeClr val="tx1"/>
+                </a:solidFill>
+                <a:effectLst/>
+                <a:latin typeface="+mn-lt"/>
+                <a:ea typeface="+mn-ea"/>
+                <a:cs typeface="+mn-cs"/>
+              </a:rPr>
+              <a:t>gav ett enhetligt </a:t>
+            </a:r>
+            <a:r>
+              <a:rPr lang="sv-SE" sz="1200" kern="1200" dirty="0" err="1" smtClean="0">
+                <a:solidFill>
+                  <a:schemeClr val="tx1"/>
+                </a:solidFill>
+                <a:effectLst/>
+                <a:latin typeface="+mn-lt"/>
+                <a:ea typeface="+mn-ea"/>
+                <a:cs typeface="+mn-cs"/>
+              </a:rPr>
+              <a:t>lägre</a:t>
+            </a:r>
+            <a:r>
+              <a:rPr lang="sv-SE" sz="1200" kern="1200" dirty="0" smtClean="0">
+                <a:solidFill>
+                  <a:schemeClr val="tx1"/>
+                </a:solidFill>
+                <a:effectLst/>
+                <a:latin typeface="+mn-lt"/>
+                <a:ea typeface="+mn-ea"/>
+                <a:cs typeface="+mn-cs"/>
+              </a:rPr>
+              <a:t> resultat (</a:t>
+            </a:r>
+            <a:r>
+              <a:rPr lang="sv-SE" sz="1200" kern="1200" dirty="0" err="1" smtClean="0">
+                <a:solidFill>
+                  <a:schemeClr val="tx1"/>
+                </a:solidFill>
+                <a:effectLst/>
+                <a:latin typeface="+mn-lt"/>
+                <a:ea typeface="+mn-ea"/>
+                <a:cs typeface="+mn-cs"/>
+              </a:rPr>
+              <a:t>medelpoäng</a:t>
+            </a:r>
+            <a:r>
+              <a:rPr lang="sv-SE" sz="1200" kern="1200" dirty="0" smtClean="0">
+                <a:solidFill>
+                  <a:schemeClr val="tx1"/>
+                </a:solidFill>
+                <a:effectLst/>
+                <a:latin typeface="+mn-lt"/>
+                <a:ea typeface="+mn-ea"/>
+                <a:cs typeface="+mn-cs"/>
+              </a:rPr>
+              <a:t> = 2 och 2) </a:t>
+            </a:r>
+            <a:r>
+              <a:rPr lang="sv-SE" sz="1200" kern="1200" dirty="0" err="1" smtClean="0">
+                <a:solidFill>
+                  <a:schemeClr val="tx1"/>
+                </a:solidFill>
+                <a:effectLst/>
+                <a:latin typeface="+mn-lt"/>
+                <a:ea typeface="+mn-ea"/>
+                <a:cs typeface="+mn-cs"/>
+              </a:rPr>
+              <a:t>jämfört</a:t>
+            </a:r>
+            <a:r>
+              <a:rPr lang="sv-SE" sz="1200" kern="1200" dirty="0" smtClean="0">
+                <a:solidFill>
+                  <a:schemeClr val="tx1"/>
+                </a:solidFill>
+                <a:effectLst/>
+                <a:latin typeface="+mn-lt"/>
+                <a:ea typeface="+mn-ea"/>
+                <a:cs typeface="+mn-cs"/>
+              </a:rPr>
+              <a:t> med </a:t>
+            </a:r>
+            <a:r>
+              <a:rPr lang="sv-SE" sz="1200" i="1" kern="1200" dirty="0" smtClean="0">
+                <a:solidFill>
+                  <a:schemeClr val="tx1"/>
+                </a:solidFill>
+                <a:effectLst/>
+                <a:latin typeface="+mn-lt"/>
+                <a:ea typeface="+mn-ea"/>
+                <a:cs typeface="+mn-cs"/>
+              </a:rPr>
+              <a:t>Guidning </a:t>
+            </a:r>
+            <a:r>
+              <a:rPr lang="sv-SE" sz="1200" kern="1200" dirty="0" smtClean="0">
+                <a:solidFill>
+                  <a:schemeClr val="tx1"/>
+                </a:solidFill>
+                <a:effectLst/>
+                <a:latin typeface="+mn-lt"/>
+                <a:ea typeface="+mn-ea"/>
+                <a:cs typeface="+mn-cs"/>
+              </a:rPr>
+              <a:t>(</a:t>
+            </a:r>
+            <a:r>
+              <a:rPr lang="sv-SE" sz="1200" kern="1200" dirty="0" err="1" smtClean="0">
+                <a:solidFill>
+                  <a:schemeClr val="tx1"/>
+                </a:solidFill>
+                <a:effectLst/>
+                <a:latin typeface="+mn-lt"/>
+                <a:ea typeface="+mn-ea"/>
+                <a:cs typeface="+mn-cs"/>
+              </a:rPr>
+              <a:t>medelpoäng</a:t>
+            </a:r>
+            <a:r>
+              <a:rPr lang="sv-SE" sz="1200" kern="1200" dirty="0" smtClean="0">
+                <a:solidFill>
+                  <a:schemeClr val="tx1"/>
+                </a:solidFill>
+                <a:effectLst/>
+                <a:latin typeface="+mn-lt"/>
+                <a:ea typeface="+mn-ea"/>
+                <a:cs typeface="+mn-cs"/>
+              </a:rPr>
+              <a:t> = 4,5)  (Figur 3b). </a:t>
+            </a:r>
+            <a:endParaRPr lang="sv-SE" dirty="0" smtClean="0">
+              <a:effectLst/>
+            </a:endParaRPr>
+          </a:p>
+          <a:p>
+            <a:endParaRPr lang="sv-SE" dirty="0" smtClean="0">
+              <a:effectLst/>
+            </a:endParaRPr>
+          </a:p>
+          <a:p>
+            <a:pPr marL="171450" indent="-171450">
+              <a:buFontTx/>
+              <a:buChar char="-"/>
+            </a:pPr>
+            <a:r>
+              <a:rPr lang="sv-SE" sz="1200" i="1" kern="1200" dirty="0" err="1" smtClean="0">
+                <a:solidFill>
+                  <a:schemeClr val="tx1"/>
+                </a:solidFill>
+                <a:effectLst/>
+                <a:latin typeface="+mn-lt"/>
+                <a:ea typeface="+mn-ea"/>
+                <a:cs typeface="+mn-cs"/>
+              </a:rPr>
+              <a:t>Bedömning</a:t>
+            </a:r>
+            <a:r>
+              <a:rPr lang="sv-SE" sz="1200" i="1" kern="1200" dirty="0" smtClean="0">
+                <a:solidFill>
+                  <a:schemeClr val="tx1"/>
+                </a:solidFill>
+                <a:effectLst/>
+                <a:latin typeface="+mn-lt"/>
+                <a:ea typeface="+mn-ea"/>
+                <a:cs typeface="+mn-cs"/>
+              </a:rPr>
+              <a:t> och </a:t>
+            </a:r>
+            <a:r>
+              <a:rPr lang="sv-SE" sz="1200" i="1" kern="1200" dirty="0" err="1" smtClean="0">
+                <a:solidFill>
+                  <a:schemeClr val="tx1"/>
+                </a:solidFill>
+                <a:effectLst/>
+                <a:latin typeface="+mn-lt"/>
+                <a:ea typeface="+mn-ea"/>
+                <a:cs typeface="+mn-cs"/>
+              </a:rPr>
+              <a:t>Utvärderings</a:t>
+            </a:r>
+            <a:r>
+              <a:rPr lang="sv-SE" sz="1200" kern="1200" dirty="0" err="1" smtClean="0">
+                <a:solidFill>
+                  <a:schemeClr val="tx1"/>
+                </a:solidFill>
+                <a:effectLst/>
+                <a:latin typeface="+mn-lt"/>
+                <a:ea typeface="+mn-ea"/>
+                <a:cs typeface="+mn-cs"/>
+              </a:rPr>
+              <a:t>-fasen</a:t>
+            </a:r>
+            <a:r>
+              <a:rPr lang="sv-SE" sz="1200" kern="1200" dirty="0" smtClean="0">
+                <a:solidFill>
+                  <a:schemeClr val="tx1"/>
+                </a:solidFill>
+                <a:effectLst/>
+                <a:latin typeface="+mn-lt"/>
+                <a:ea typeface="+mn-ea"/>
+                <a:cs typeface="+mn-cs"/>
+              </a:rPr>
+              <a:t> fick den </a:t>
+            </a:r>
+            <a:r>
+              <a:rPr lang="sv-SE" sz="1200" kern="1200" dirty="0" err="1" smtClean="0">
+                <a:solidFill>
+                  <a:schemeClr val="tx1"/>
+                </a:solidFill>
+                <a:effectLst/>
+                <a:latin typeface="+mn-lt"/>
+                <a:ea typeface="+mn-ea"/>
+                <a:cs typeface="+mn-cs"/>
+              </a:rPr>
+              <a:t>lägsta</a:t>
+            </a:r>
+            <a:r>
+              <a:rPr lang="sv-SE" sz="1200" kern="1200" dirty="0" smtClean="0">
+                <a:solidFill>
+                  <a:schemeClr val="tx1"/>
+                </a:solidFill>
+                <a:effectLst/>
+                <a:latin typeface="+mn-lt"/>
+                <a:ea typeface="+mn-ea"/>
+                <a:cs typeface="+mn-cs"/>
+              </a:rPr>
+              <a:t> </a:t>
+            </a:r>
+            <a:r>
+              <a:rPr lang="sv-SE" sz="1200" kern="1200" dirty="0" err="1" smtClean="0">
+                <a:solidFill>
+                  <a:schemeClr val="tx1"/>
+                </a:solidFill>
+                <a:effectLst/>
+                <a:latin typeface="+mn-lt"/>
+                <a:ea typeface="+mn-ea"/>
+                <a:cs typeface="+mn-cs"/>
+              </a:rPr>
+              <a:t>medelpoängen</a:t>
+            </a:r>
+            <a:r>
+              <a:rPr lang="sv-SE" sz="1200" kern="1200" dirty="0" smtClean="0">
+                <a:solidFill>
+                  <a:schemeClr val="tx1"/>
+                </a:solidFill>
+                <a:effectLst/>
+                <a:latin typeface="+mn-lt"/>
+                <a:ea typeface="+mn-ea"/>
+                <a:cs typeface="+mn-cs"/>
+              </a:rPr>
+              <a:t> </a:t>
+            </a:r>
+            <a:r>
+              <a:rPr lang="sv-SE" sz="1200" kern="1200" dirty="0" err="1" smtClean="0">
+                <a:solidFill>
+                  <a:schemeClr val="tx1"/>
+                </a:solidFill>
+                <a:effectLst/>
+                <a:latin typeface="+mn-lt"/>
+                <a:ea typeface="+mn-ea"/>
+                <a:cs typeface="+mn-cs"/>
+              </a:rPr>
+              <a:t>jämfört</a:t>
+            </a:r>
+            <a:r>
+              <a:rPr lang="sv-SE" sz="1200" kern="1200" dirty="0" smtClean="0">
+                <a:solidFill>
+                  <a:schemeClr val="tx1"/>
+                </a:solidFill>
+                <a:effectLst/>
+                <a:latin typeface="+mn-lt"/>
+                <a:ea typeface="+mn-ea"/>
+                <a:cs typeface="+mn-cs"/>
+              </a:rPr>
+              <a:t> med alla DIM-faser. </a:t>
+            </a:r>
+          </a:p>
+          <a:p>
+            <a:endParaRPr lang="sv-SE" sz="1200" kern="1200" dirty="0" smtClean="0">
+              <a:solidFill>
+                <a:schemeClr val="tx1"/>
+              </a:solidFill>
+              <a:effectLst/>
+              <a:latin typeface="+mn-lt"/>
+              <a:ea typeface="+mn-ea"/>
+              <a:cs typeface="+mn-cs"/>
+            </a:endParaRPr>
+          </a:p>
+          <a:p>
+            <a:pPr marL="171450" indent="-171450">
+              <a:buFontTx/>
+              <a:buChar char="-"/>
+            </a:pPr>
+            <a:r>
+              <a:rPr lang="sv-SE" sz="1200" kern="1200" dirty="0" smtClean="0">
+                <a:solidFill>
+                  <a:schemeClr val="tx1"/>
+                </a:solidFill>
+                <a:effectLst/>
+                <a:latin typeface="+mn-lt"/>
+                <a:ea typeface="+mn-ea"/>
+                <a:cs typeface="+mn-cs"/>
+              </a:rPr>
+              <a:t>Fasen </a:t>
+            </a:r>
+            <a:r>
+              <a:rPr lang="sv-SE" sz="1200" i="1" kern="1200" dirty="0" err="1" smtClean="0">
+                <a:solidFill>
+                  <a:schemeClr val="tx1"/>
+                </a:solidFill>
+                <a:effectLst/>
+                <a:latin typeface="+mn-lt"/>
+                <a:ea typeface="+mn-ea"/>
+                <a:cs typeface="+mn-cs"/>
+              </a:rPr>
+              <a:t>Övervakning</a:t>
+            </a:r>
+            <a:r>
+              <a:rPr lang="sv-SE" sz="1200" i="1" kern="1200" dirty="0" smtClean="0">
+                <a:solidFill>
+                  <a:schemeClr val="tx1"/>
+                </a:solidFill>
+                <a:effectLst/>
+                <a:latin typeface="+mn-lt"/>
+                <a:ea typeface="+mn-ea"/>
+                <a:cs typeface="+mn-cs"/>
+              </a:rPr>
+              <a:t> och </a:t>
+            </a:r>
+            <a:r>
+              <a:rPr lang="sv-SE" sz="1200" i="1" kern="1200" dirty="0" err="1" smtClean="0">
+                <a:solidFill>
+                  <a:schemeClr val="tx1"/>
+                </a:solidFill>
+                <a:effectLst/>
+                <a:latin typeface="+mn-lt"/>
+                <a:ea typeface="+mn-ea"/>
+                <a:cs typeface="+mn-cs"/>
+              </a:rPr>
+              <a:t>Återkoppling</a:t>
+            </a:r>
+            <a:r>
+              <a:rPr lang="sv-SE" sz="1200" i="1" kern="1200" dirty="0" smtClean="0">
+                <a:solidFill>
+                  <a:schemeClr val="tx1"/>
+                </a:solidFill>
+                <a:effectLst/>
+                <a:latin typeface="+mn-lt"/>
+                <a:ea typeface="+mn-ea"/>
+                <a:cs typeface="+mn-cs"/>
+              </a:rPr>
+              <a:t> </a:t>
+            </a:r>
+            <a:r>
+              <a:rPr lang="sv-SE" sz="1200" kern="1200" dirty="0" err="1" smtClean="0">
+                <a:solidFill>
+                  <a:schemeClr val="tx1"/>
+                </a:solidFill>
+                <a:effectLst/>
+                <a:latin typeface="+mn-lt"/>
+                <a:ea typeface="+mn-ea"/>
+                <a:cs typeface="+mn-cs"/>
+              </a:rPr>
+              <a:t>innehåller</a:t>
+            </a:r>
+            <a:r>
+              <a:rPr lang="sv-SE" sz="1200" kern="1200" dirty="0" smtClean="0">
+                <a:solidFill>
+                  <a:schemeClr val="tx1"/>
+                </a:solidFill>
+                <a:effectLst/>
+                <a:latin typeface="+mn-lt"/>
+                <a:ea typeface="+mn-ea"/>
+                <a:cs typeface="+mn-cs"/>
+              </a:rPr>
+              <a:t> elementet </a:t>
+            </a:r>
+            <a:r>
+              <a:rPr lang="sv-SE" sz="1200" i="1" kern="1200" dirty="0" err="1" smtClean="0">
+                <a:solidFill>
+                  <a:schemeClr val="tx1"/>
+                </a:solidFill>
+                <a:effectLst/>
+                <a:latin typeface="+mn-lt"/>
+                <a:ea typeface="+mn-ea"/>
+                <a:cs typeface="+mn-cs"/>
+              </a:rPr>
+              <a:t>Ledtrådar</a:t>
+            </a:r>
+            <a:r>
+              <a:rPr lang="sv-SE" sz="1200" i="1" kern="1200" dirty="0" smtClean="0">
+                <a:solidFill>
+                  <a:schemeClr val="tx1"/>
+                </a:solidFill>
+                <a:effectLst/>
+                <a:latin typeface="+mn-lt"/>
+                <a:ea typeface="+mn-ea"/>
+                <a:cs typeface="+mn-cs"/>
+              </a:rPr>
+              <a:t> och Uppmaningar </a:t>
+            </a:r>
+            <a:r>
+              <a:rPr lang="sv-SE" sz="1200" kern="1200" dirty="0" smtClean="0">
+                <a:solidFill>
+                  <a:schemeClr val="tx1"/>
+                </a:solidFill>
+                <a:effectLst/>
+                <a:latin typeface="+mn-lt"/>
+                <a:ea typeface="+mn-ea"/>
+                <a:cs typeface="+mn-cs"/>
+              </a:rPr>
+              <a:t>som visade ett </a:t>
+            </a:r>
+            <a:r>
+              <a:rPr lang="sv-SE" sz="1200" kern="1200" dirty="0" err="1" smtClean="0">
+                <a:solidFill>
+                  <a:schemeClr val="tx1"/>
+                </a:solidFill>
+                <a:effectLst/>
+                <a:latin typeface="+mn-lt"/>
+                <a:ea typeface="+mn-ea"/>
+                <a:cs typeface="+mn-cs"/>
+              </a:rPr>
+              <a:t>lågt</a:t>
+            </a:r>
+            <a:r>
+              <a:rPr lang="sv-SE" sz="1200" kern="1200" dirty="0" smtClean="0">
+                <a:solidFill>
+                  <a:schemeClr val="tx1"/>
+                </a:solidFill>
+                <a:effectLst/>
+                <a:latin typeface="+mn-lt"/>
+                <a:ea typeface="+mn-ea"/>
+                <a:cs typeface="+mn-cs"/>
+              </a:rPr>
+              <a:t> resultat (</a:t>
+            </a:r>
+            <a:r>
+              <a:rPr lang="sv-SE" sz="1200" kern="1200" dirty="0" err="1" smtClean="0">
+                <a:solidFill>
+                  <a:schemeClr val="tx1"/>
+                </a:solidFill>
+                <a:effectLst/>
+                <a:latin typeface="+mn-lt"/>
+                <a:ea typeface="+mn-ea"/>
+                <a:cs typeface="+mn-cs"/>
+              </a:rPr>
+              <a:t>medelpoäng</a:t>
+            </a:r>
+            <a:r>
+              <a:rPr lang="sv-SE" sz="1200" kern="1200" dirty="0" smtClean="0">
+                <a:solidFill>
+                  <a:schemeClr val="tx1"/>
+                </a:solidFill>
+                <a:effectLst/>
+                <a:latin typeface="+mn-lt"/>
+                <a:ea typeface="+mn-ea"/>
+                <a:cs typeface="+mn-cs"/>
+              </a:rPr>
+              <a:t> = 0,6), </a:t>
+            </a:r>
+            <a:r>
+              <a:rPr lang="sv-SE" sz="1200" kern="1200" dirty="0" err="1" smtClean="0">
+                <a:solidFill>
+                  <a:schemeClr val="tx1"/>
+                </a:solidFill>
+                <a:effectLst/>
+                <a:latin typeface="+mn-lt"/>
+                <a:ea typeface="+mn-ea"/>
+                <a:cs typeface="+mn-cs"/>
+              </a:rPr>
+              <a:t>däremot</a:t>
+            </a:r>
+            <a:r>
+              <a:rPr lang="sv-SE" sz="1200" kern="1200" dirty="0" smtClean="0">
+                <a:solidFill>
+                  <a:schemeClr val="tx1"/>
+                </a:solidFill>
+                <a:effectLst/>
+                <a:latin typeface="+mn-lt"/>
+                <a:ea typeface="+mn-ea"/>
+                <a:cs typeface="+mn-cs"/>
+              </a:rPr>
+              <a:t> </a:t>
+            </a:r>
+            <a:r>
+              <a:rPr lang="sv-SE" sz="1200" kern="1200" dirty="0" err="1" smtClean="0">
+                <a:solidFill>
+                  <a:schemeClr val="tx1"/>
+                </a:solidFill>
+                <a:effectLst/>
+                <a:latin typeface="+mn-lt"/>
+                <a:ea typeface="+mn-ea"/>
+                <a:cs typeface="+mn-cs"/>
+              </a:rPr>
+              <a:t>räddas</a:t>
+            </a:r>
+            <a:r>
+              <a:rPr lang="sv-SE" sz="1200" kern="1200" dirty="0" smtClean="0">
+                <a:solidFill>
+                  <a:schemeClr val="tx1"/>
+                </a:solidFill>
+                <a:effectLst/>
+                <a:latin typeface="+mn-lt"/>
+                <a:ea typeface="+mn-ea"/>
+                <a:cs typeface="+mn-cs"/>
+              </a:rPr>
+              <a:t> fasens </a:t>
+            </a:r>
+            <a:r>
+              <a:rPr lang="sv-SE" sz="1200" kern="1200" dirty="0" err="1" smtClean="0">
+                <a:solidFill>
+                  <a:schemeClr val="tx1"/>
+                </a:solidFill>
+                <a:effectLst/>
+                <a:latin typeface="+mn-lt"/>
+                <a:ea typeface="+mn-ea"/>
+                <a:cs typeface="+mn-cs"/>
+              </a:rPr>
+              <a:t>medelvärde</a:t>
+            </a:r>
+            <a:r>
+              <a:rPr lang="sv-SE" sz="1200" kern="1200" dirty="0" smtClean="0">
+                <a:solidFill>
+                  <a:schemeClr val="tx1"/>
+                </a:solidFill>
+                <a:effectLst/>
+                <a:latin typeface="+mn-lt"/>
+                <a:ea typeface="+mn-ea"/>
+                <a:cs typeface="+mn-cs"/>
+              </a:rPr>
+              <a:t> delvis av att elementet </a:t>
+            </a:r>
+            <a:r>
+              <a:rPr lang="sv-SE" sz="1200" i="1" kern="1200" dirty="0" smtClean="0">
+                <a:solidFill>
+                  <a:schemeClr val="tx1"/>
+                </a:solidFill>
+                <a:effectLst/>
+                <a:latin typeface="+mn-lt"/>
+                <a:ea typeface="+mn-ea"/>
+                <a:cs typeface="+mn-cs"/>
+              </a:rPr>
+              <a:t>Support </a:t>
+            </a:r>
+            <a:r>
+              <a:rPr lang="sv-SE" sz="1200" kern="1200" dirty="0" smtClean="0">
+                <a:solidFill>
+                  <a:schemeClr val="tx1"/>
+                </a:solidFill>
+                <a:effectLst/>
+                <a:latin typeface="+mn-lt"/>
+                <a:ea typeface="+mn-ea"/>
+                <a:cs typeface="+mn-cs"/>
+              </a:rPr>
+              <a:t>har ett </a:t>
+            </a:r>
+            <a:r>
+              <a:rPr lang="sv-SE" sz="1200" kern="1200" dirty="0" err="1" smtClean="0">
+                <a:solidFill>
+                  <a:schemeClr val="tx1"/>
+                </a:solidFill>
+                <a:effectLst/>
+                <a:latin typeface="+mn-lt"/>
+                <a:ea typeface="+mn-ea"/>
+                <a:cs typeface="+mn-cs"/>
+              </a:rPr>
+              <a:t>högt</a:t>
+            </a:r>
+            <a:r>
+              <a:rPr lang="sv-SE" sz="1200" kern="1200" dirty="0" smtClean="0">
+                <a:solidFill>
+                  <a:schemeClr val="tx1"/>
+                </a:solidFill>
+                <a:effectLst/>
+                <a:latin typeface="+mn-lt"/>
+                <a:ea typeface="+mn-ea"/>
+                <a:cs typeface="+mn-cs"/>
+              </a:rPr>
+              <a:t> resultat (</a:t>
+            </a:r>
+            <a:r>
+              <a:rPr lang="sv-SE" sz="1200" kern="1200" dirty="0" err="1" smtClean="0">
+                <a:solidFill>
+                  <a:schemeClr val="tx1"/>
+                </a:solidFill>
+                <a:effectLst/>
+                <a:latin typeface="+mn-lt"/>
+                <a:ea typeface="+mn-ea"/>
+                <a:cs typeface="+mn-cs"/>
+              </a:rPr>
+              <a:t>medelpoäng</a:t>
+            </a:r>
+            <a:r>
+              <a:rPr lang="sv-SE" sz="1200" kern="1200" dirty="0" smtClean="0">
+                <a:solidFill>
+                  <a:schemeClr val="tx1"/>
+                </a:solidFill>
+                <a:effectLst/>
+                <a:latin typeface="+mn-lt"/>
+                <a:ea typeface="+mn-ea"/>
+                <a:cs typeface="+mn-cs"/>
+              </a:rPr>
+              <a:t> = 3,8) </a:t>
+            </a:r>
+            <a:endParaRPr lang="sv-SE" dirty="0" smtClean="0"/>
+          </a:p>
+          <a:p>
+            <a:pPr marL="0" marR="0" indent="0" algn="l" defTabSz="457200" rtl="0" eaLnBrk="1" fontAlgn="auto" latinLnBrk="0" hangingPunct="1">
+              <a:lnSpc>
+                <a:spcPct val="100000"/>
+              </a:lnSpc>
+              <a:spcBef>
+                <a:spcPts val="0"/>
+              </a:spcBef>
+              <a:spcAft>
+                <a:spcPts val="0"/>
+              </a:spcAft>
+              <a:buClrTx/>
+              <a:buSzTx/>
+              <a:buFontTx/>
+              <a:buNone/>
+              <a:tabLst/>
+              <a:defRPr/>
+            </a:pPr>
+            <a:endParaRPr lang="sv-SE" dirty="0" smtClean="0"/>
+          </a:p>
+          <a:p>
+            <a:pPr marL="0" marR="0" indent="0" algn="l" defTabSz="457200" rtl="0" eaLnBrk="1" fontAlgn="auto" latinLnBrk="0" hangingPunct="1">
+              <a:lnSpc>
+                <a:spcPct val="100000"/>
+              </a:lnSpc>
+              <a:spcBef>
+                <a:spcPts val="0"/>
+              </a:spcBef>
+              <a:spcAft>
+                <a:spcPts val="0"/>
+              </a:spcAft>
+              <a:buClrTx/>
+              <a:buSzTx/>
+              <a:buFontTx/>
+              <a:buNone/>
+              <a:tabLst/>
+              <a:defRPr/>
+            </a:pPr>
+            <a:r>
+              <a:rPr lang="sv-SE" sz="1200" kern="1200" dirty="0" smtClean="0">
+                <a:solidFill>
+                  <a:schemeClr val="tx1"/>
+                </a:solidFill>
+                <a:effectLst/>
+                <a:latin typeface="+mn-lt"/>
+                <a:ea typeface="+mn-ea"/>
+                <a:cs typeface="+mn-cs"/>
+              </a:rPr>
+              <a:t>3) Sammanfattningsvis ger resultatet </a:t>
+            </a:r>
+            <a:r>
+              <a:rPr lang="sv-SE" sz="1200" kern="1200" dirty="0" err="1" smtClean="0">
+                <a:solidFill>
+                  <a:schemeClr val="tx1"/>
+                </a:solidFill>
+                <a:effectLst/>
+                <a:latin typeface="+mn-lt"/>
+                <a:ea typeface="+mn-ea"/>
+                <a:cs typeface="+mn-cs"/>
+              </a:rPr>
+              <a:t>från</a:t>
+            </a:r>
+            <a:r>
+              <a:rPr lang="sv-SE" sz="1200" kern="1200" dirty="0" smtClean="0">
+                <a:solidFill>
+                  <a:schemeClr val="tx1"/>
+                </a:solidFill>
+                <a:effectLst/>
+                <a:latin typeface="+mn-lt"/>
+                <a:ea typeface="+mn-ea"/>
+                <a:cs typeface="+mn-cs"/>
+              </a:rPr>
+              <a:t> denna analys en bild </a:t>
+            </a:r>
+            <a:r>
+              <a:rPr lang="sv-SE" sz="1200" kern="1200" dirty="0" err="1" smtClean="0">
+                <a:solidFill>
+                  <a:schemeClr val="tx1"/>
+                </a:solidFill>
+                <a:effectLst/>
+                <a:latin typeface="+mn-lt"/>
+                <a:ea typeface="+mn-ea"/>
+                <a:cs typeface="+mn-cs"/>
+              </a:rPr>
+              <a:t>över</a:t>
+            </a:r>
+            <a:r>
+              <a:rPr lang="sv-SE" sz="1200" kern="1200" dirty="0" smtClean="0">
+                <a:solidFill>
+                  <a:schemeClr val="tx1"/>
+                </a:solidFill>
+                <a:effectLst/>
+                <a:latin typeface="+mn-lt"/>
+                <a:ea typeface="+mn-ea"/>
+                <a:cs typeface="+mn-cs"/>
+              </a:rPr>
+              <a:t> vilka delar av kursen som skulle kunna </a:t>
+            </a:r>
+            <a:r>
+              <a:rPr lang="sv-SE" sz="1200" kern="1200" dirty="0" err="1" smtClean="0">
+                <a:solidFill>
+                  <a:schemeClr val="tx1"/>
+                </a:solidFill>
+                <a:effectLst/>
+                <a:latin typeface="+mn-lt"/>
+                <a:ea typeface="+mn-ea"/>
+                <a:cs typeface="+mn-cs"/>
+              </a:rPr>
+              <a:t>förbättras</a:t>
+            </a:r>
+            <a:r>
+              <a:rPr lang="sv-SE" sz="1200" kern="1200" dirty="0" smtClean="0">
+                <a:solidFill>
+                  <a:schemeClr val="tx1"/>
+                </a:solidFill>
+                <a:effectLst/>
+                <a:latin typeface="+mn-lt"/>
+                <a:ea typeface="+mn-ea"/>
+                <a:cs typeface="+mn-cs"/>
+              </a:rPr>
+              <a:t> enligt DIM </a:t>
+            </a:r>
+            <a:r>
+              <a:rPr lang="sv-SE" sz="1200" kern="1200" dirty="0" err="1" smtClean="0">
+                <a:solidFill>
+                  <a:schemeClr val="tx1"/>
+                </a:solidFill>
+                <a:effectLst/>
+                <a:latin typeface="+mn-lt"/>
+                <a:ea typeface="+mn-ea"/>
+                <a:cs typeface="+mn-cs"/>
+              </a:rPr>
+              <a:t>där</a:t>
+            </a:r>
+            <a:r>
+              <a:rPr lang="sv-SE" sz="1200" kern="1200" dirty="0" smtClean="0">
+                <a:solidFill>
+                  <a:schemeClr val="tx1"/>
+                </a:solidFill>
+                <a:effectLst/>
+                <a:latin typeface="+mn-lt"/>
+                <a:ea typeface="+mn-ea"/>
+                <a:cs typeface="+mn-cs"/>
+              </a:rPr>
+              <a:t> </a:t>
+            </a:r>
+            <a:r>
+              <a:rPr lang="sv-SE" sz="1200" i="1" kern="1200" dirty="0" err="1" smtClean="0">
+                <a:solidFill>
+                  <a:schemeClr val="tx1"/>
+                </a:solidFill>
+                <a:effectLst/>
+                <a:latin typeface="+mn-lt"/>
+                <a:ea typeface="+mn-ea"/>
+                <a:cs typeface="+mn-cs"/>
+              </a:rPr>
+              <a:t>Bedömning</a:t>
+            </a:r>
+            <a:r>
+              <a:rPr lang="sv-SE" sz="1200" i="1" kern="1200" dirty="0" smtClean="0">
+                <a:solidFill>
+                  <a:schemeClr val="tx1"/>
+                </a:solidFill>
+                <a:effectLst/>
+                <a:latin typeface="+mn-lt"/>
+                <a:ea typeface="+mn-ea"/>
+                <a:cs typeface="+mn-cs"/>
+              </a:rPr>
+              <a:t> och </a:t>
+            </a:r>
+            <a:r>
+              <a:rPr lang="sv-SE" sz="1200" i="1" kern="1200" dirty="0" err="1" smtClean="0">
+                <a:solidFill>
+                  <a:schemeClr val="tx1"/>
+                </a:solidFill>
+                <a:effectLst/>
+                <a:latin typeface="+mn-lt"/>
+                <a:ea typeface="+mn-ea"/>
+                <a:cs typeface="+mn-cs"/>
+              </a:rPr>
+              <a:t>Utvärdering</a:t>
+            </a:r>
+            <a:r>
+              <a:rPr lang="sv-SE" sz="1200" i="1" kern="1200" dirty="0" smtClean="0">
+                <a:solidFill>
+                  <a:schemeClr val="tx1"/>
+                </a:solidFill>
+                <a:effectLst/>
+                <a:latin typeface="+mn-lt"/>
+                <a:ea typeface="+mn-ea"/>
+                <a:cs typeface="+mn-cs"/>
+              </a:rPr>
+              <a:t>-</a:t>
+            </a:r>
+            <a:r>
+              <a:rPr lang="sv-SE" sz="1200" kern="1200" dirty="0" smtClean="0">
+                <a:solidFill>
+                  <a:schemeClr val="tx1"/>
+                </a:solidFill>
+                <a:effectLst/>
+                <a:latin typeface="+mn-lt"/>
+                <a:ea typeface="+mn-ea"/>
+                <a:cs typeface="+mn-cs"/>
+              </a:rPr>
+              <a:t> fasen </a:t>
+            </a:r>
+            <a:r>
+              <a:rPr lang="sv-SE" sz="1200" kern="1200" dirty="0" err="1" smtClean="0">
+                <a:solidFill>
+                  <a:schemeClr val="tx1"/>
+                </a:solidFill>
+                <a:effectLst/>
+                <a:latin typeface="+mn-lt"/>
+                <a:ea typeface="+mn-ea"/>
+                <a:cs typeface="+mn-cs"/>
+              </a:rPr>
+              <a:t>bör</a:t>
+            </a:r>
+            <a:r>
+              <a:rPr lang="sv-SE" sz="1200" kern="1200" dirty="0" smtClean="0">
+                <a:solidFill>
+                  <a:schemeClr val="tx1"/>
+                </a:solidFill>
+                <a:effectLst/>
+                <a:latin typeface="+mn-lt"/>
+                <a:ea typeface="+mn-ea"/>
+                <a:cs typeface="+mn-cs"/>
+              </a:rPr>
+              <a:t> prioriteras </a:t>
+            </a:r>
+            <a:r>
+              <a:rPr lang="sv-SE" sz="1200" kern="1200" dirty="0" err="1" smtClean="0">
+                <a:solidFill>
+                  <a:schemeClr val="tx1"/>
+                </a:solidFill>
+                <a:effectLst/>
+                <a:latin typeface="+mn-lt"/>
+                <a:ea typeface="+mn-ea"/>
+                <a:cs typeface="+mn-cs"/>
+              </a:rPr>
+              <a:t>högst</a:t>
+            </a:r>
+            <a:r>
+              <a:rPr lang="sv-SE" sz="1200" kern="1200" dirty="0" smtClean="0">
+                <a:solidFill>
+                  <a:schemeClr val="tx1"/>
+                </a:solidFill>
+                <a:effectLst/>
+                <a:latin typeface="+mn-lt"/>
+                <a:ea typeface="+mn-ea"/>
+                <a:cs typeface="+mn-cs"/>
+              </a:rPr>
+              <a:t> </a:t>
+            </a:r>
+            <a:r>
+              <a:rPr lang="sv-SE" sz="1200" kern="1200" dirty="0" err="1" smtClean="0">
+                <a:solidFill>
+                  <a:schemeClr val="tx1"/>
+                </a:solidFill>
+                <a:effectLst/>
+                <a:latin typeface="+mn-lt"/>
+                <a:ea typeface="+mn-ea"/>
+                <a:cs typeface="+mn-cs"/>
+              </a:rPr>
+              <a:t>för</a:t>
+            </a:r>
+            <a:r>
+              <a:rPr lang="sv-SE" sz="1200" kern="1200" dirty="0" smtClean="0">
+                <a:solidFill>
+                  <a:schemeClr val="tx1"/>
+                </a:solidFill>
+                <a:effectLst/>
+                <a:latin typeface="+mn-lt"/>
+                <a:ea typeface="+mn-ea"/>
+                <a:cs typeface="+mn-cs"/>
+              </a:rPr>
+              <a:t> att bidrag till de </a:t>
+            </a:r>
+            <a:r>
+              <a:rPr lang="sv-SE" sz="1200" kern="1200" dirty="0" err="1" smtClean="0">
+                <a:solidFill>
+                  <a:schemeClr val="tx1"/>
+                </a:solidFill>
+                <a:effectLst/>
+                <a:latin typeface="+mn-lt"/>
+                <a:ea typeface="+mn-ea"/>
+                <a:cs typeface="+mn-cs"/>
+              </a:rPr>
+              <a:t>största</a:t>
+            </a:r>
+            <a:r>
+              <a:rPr lang="sv-SE" sz="1200" kern="1200" dirty="0" smtClean="0">
+                <a:solidFill>
+                  <a:schemeClr val="tx1"/>
+                </a:solidFill>
+                <a:effectLst/>
+                <a:latin typeface="+mn-lt"/>
+                <a:ea typeface="+mn-ea"/>
+                <a:cs typeface="+mn-cs"/>
+              </a:rPr>
+              <a:t> </a:t>
+            </a:r>
+            <a:r>
+              <a:rPr lang="sv-SE" sz="1200" kern="1200" dirty="0" err="1" smtClean="0">
+                <a:solidFill>
+                  <a:schemeClr val="tx1"/>
+                </a:solidFill>
+                <a:effectLst/>
+                <a:latin typeface="+mn-lt"/>
+                <a:ea typeface="+mn-ea"/>
+                <a:cs typeface="+mn-cs"/>
+              </a:rPr>
+              <a:t>möjliga</a:t>
+            </a:r>
+            <a:r>
+              <a:rPr lang="sv-SE" sz="1200" kern="1200" dirty="0" smtClean="0">
+                <a:solidFill>
+                  <a:schemeClr val="tx1"/>
+                </a:solidFill>
+                <a:effectLst/>
+                <a:latin typeface="+mn-lt"/>
+                <a:ea typeface="+mn-ea"/>
+                <a:cs typeface="+mn-cs"/>
+              </a:rPr>
+              <a:t> </a:t>
+            </a:r>
+            <a:r>
+              <a:rPr lang="sv-SE" sz="1200" kern="1200" dirty="0" err="1" smtClean="0">
+                <a:solidFill>
+                  <a:schemeClr val="tx1"/>
+                </a:solidFill>
+                <a:effectLst/>
+                <a:latin typeface="+mn-lt"/>
+                <a:ea typeface="+mn-ea"/>
+                <a:cs typeface="+mn-cs"/>
+              </a:rPr>
+              <a:t>förbättringarna</a:t>
+            </a:r>
+            <a:r>
+              <a:rPr lang="sv-SE" sz="1200" kern="1200" dirty="0" smtClean="0">
+                <a:solidFill>
+                  <a:schemeClr val="tx1"/>
+                </a:solidFill>
+                <a:effectLst/>
+                <a:latin typeface="+mn-lt"/>
+                <a:ea typeface="+mn-ea"/>
+                <a:cs typeface="+mn-cs"/>
+              </a:rPr>
+              <a:t>. </a:t>
+            </a:r>
+            <a:endParaRPr lang="sv-SE" dirty="0" smtClean="0">
+              <a:effectLst/>
+            </a:endParaRPr>
+          </a:p>
+          <a:p>
+            <a:pPr marL="0" marR="0" indent="0" algn="l" defTabSz="457200" rtl="0" eaLnBrk="1" fontAlgn="auto" latinLnBrk="0" hangingPunct="1">
+              <a:lnSpc>
+                <a:spcPct val="100000"/>
+              </a:lnSpc>
+              <a:spcBef>
+                <a:spcPts val="0"/>
+              </a:spcBef>
+              <a:spcAft>
+                <a:spcPts val="0"/>
+              </a:spcAft>
+              <a:buClrTx/>
+              <a:buSzTx/>
+              <a:buFontTx/>
+              <a:buNone/>
+              <a:tabLst/>
+              <a:defRPr/>
+            </a:pPr>
+            <a:endParaRPr lang="sv-SE" dirty="0" smtClean="0"/>
+          </a:p>
+          <a:p>
+            <a:pPr marL="0" marR="0" indent="0" algn="l" defTabSz="457200" rtl="0" eaLnBrk="1" fontAlgn="auto" latinLnBrk="0" hangingPunct="1">
+              <a:lnSpc>
+                <a:spcPct val="100000"/>
+              </a:lnSpc>
+              <a:spcBef>
+                <a:spcPts val="0"/>
+              </a:spcBef>
+              <a:spcAft>
+                <a:spcPts val="0"/>
+              </a:spcAft>
+              <a:buClrTx/>
+              <a:buSzTx/>
+              <a:buFontTx/>
+              <a:buNone/>
+              <a:tabLst/>
+              <a:defRPr/>
+            </a:pPr>
+            <a:endParaRPr lang="sv-SE" dirty="0" smtClean="0"/>
+          </a:p>
+          <a:p>
+            <a:pPr marL="0" marR="0" indent="0" algn="l" defTabSz="457200" rtl="0" eaLnBrk="1" fontAlgn="auto" latinLnBrk="0" hangingPunct="1">
+              <a:lnSpc>
+                <a:spcPct val="100000"/>
+              </a:lnSpc>
+              <a:spcBef>
+                <a:spcPts val="0"/>
+              </a:spcBef>
+              <a:spcAft>
+                <a:spcPts val="0"/>
+              </a:spcAft>
+              <a:buClrTx/>
+              <a:buSzTx/>
+              <a:buFontTx/>
+              <a:buNone/>
+              <a:tabLst/>
+              <a:defRPr/>
+            </a:pPr>
             <a:r>
               <a:rPr lang="sv-SE" dirty="0" err="1" smtClean="0"/>
-              <a:t>Summarize</a:t>
+              <a:t>Say</a:t>
+            </a:r>
+            <a:r>
+              <a:rPr lang="sv-SE" dirty="0" smtClean="0"/>
+              <a:t>: </a:t>
+            </a:r>
+            <a:r>
+              <a:rPr lang="sv-SE" dirty="0" err="1" smtClean="0"/>
+              <a:t>purpose</a:t>
+            </a:r>
+            <a:r>
+              <a:rPr lang="sv-SE" dirty="0" smtClean="0"/>
+              <a:t>,, present </a:t>
+            </a:r>
+            <a:r>
+              <a:rPr lang="sv-SE" dirty="0" err="1" smtClean="0"/>
+              <a:t>result</a:t>
+            </a:r>
+            <a:r>
+              <a:rPr lang="sv-SE" dirty="0" smtClean="0"/>
+              <a:t>, </a:t>
+            </a:r>
+            <a:r>
+              <a:rPr lang="sv-SE" dirty="0" err="1" smtClean="0"/>
+              <a:t>draw</a:t>
             </a:r>
             <a:r>
               <a:rPr lang="sv-SE" dirty="0" smtClean="0"/>
@@ -1057,28 +3619,11 @@
             </a:r>
             <a:r>
               <a:rPr lang="sv-SE" dirty="0" err="1" smtClean="0"/>
-              <a:t>results</a:t>
-            </a:r>
-            <a:r>
-              <a:rPr lang="sv-SE" dirty="0" smtClean="0"/>
-              <a:t> and </a:t>
-            </a:r>
-            <a:r>
-              <a:rPr lang="sv-SE" dirty="0" err="1" smtClean="0"/>
-              <a:t>add</a:t>
-            </a:r>
-            <a:r>
-              <a:rPr lang="sv-SE" dirty="0" smtClean="0"/>
-              <a:t> </a:t>
-            </a:r>
-            <a:r>
-              <a:rPr lang="sv-SE" dirty="0" err="1" smtClean="0"/>
               <a:t>conclusions</a:t>
             </a:r>
-            <a:r>
-              <a:rPr lang="sv-SE" dirty="0" smtClean="0"/>
-              <a:t> for utvärdering</a:t>
-            </a:r>
+            <a:endParaRPr lang="sv-SE" dirty="0" smtClean="0"/>
+          </a:p>
+          <a:p>
             <a:endParaRPr lang="sv-SE" dirty="0"/>
           </a:p>
         </p:txBody>
@@ -1100,7 +3645,7 @@
           <a:p>
             <a:fld id="{37FE1B89-C8F8-664A-A32D-5606C0AF9B96}" type="slidenum">
               <a:rPr lang="sv-SE" smtClean="0"/>
-              <a:t>13</a:t>
+              <a:t>12</a:t>
             </a:fld>
             <a:endParaRPr lang="sv-SE"/>
           </a:p>
@@ -1109,7 +3654,7 @@
     </p:spTree>
     <p:extLst>
       <p:ext uri="{BB962C8B-B14F-4D97-AF65-F5344CB8AC3E}">
-        <p14:creationId xmlns:p14="http://schemas.microsoft.com/office/powerpoint/2010/main" val="340287731"/>
+        <p14:creationId xmlns:p14="http://schemas.microsoft.com/office/powerpoint/2010/main" val="4271137318"/>
       </p:ext>
     </p:extLst>
   </p:cSld>
@@ -1164,12 +3709,633 @@
           <a:lstStyle/>
           <a:p>
             <a:r>
+              <a:rPr lang="sv-SE" dirty="0" smtClean="0"/>
+              <a:t>Sammanfattningsvis gör</a:t>
+            </a:r>
+            <a:r>
+              <a:rPr lang="sv-SE" baseline="0" dirty="0" smtClean="0"/>
+              <a:t> utvärderingsmomentet att delar av Grades kurser skulle kunna förbättras enligt DIM och </a:t>
+            </a:r>
+            <a:r>
+              <a:rPr lang="sv-SE" sz="1200" kern="1200" dirty="0" err="1" smtClean="0">
+                <a:solidFill>
+                  <a:schemeClr val="tx1"/>
+                </a:solidFill>
+                <a:effectLst/>
+                <a:latin typeface="+mn-lt"/>
+                <a:ea typeface="+mn-ea"/>
+                <a:cs typeface="+mn-cs"/>
+              </a:rPr>
+              <a:t>där</a:t>
+            </a:r>
+            <a:r>
+              <a:rPr lang="sv-SE" sz="1200" kern="1200" dirty="0" smtClean="0">
+                <a:solidFill>
+                  <a:schemeClr val="tx1"/>
+                </a:solidFill>
+                <a:effectLst/>
+                <a:latin typeface="+mn-lt"/>
+                <a:ea typeface="+mn-ea"/>
+                <a:cs typeface="+mn-cs"/>
+              </a:rPr>
+              <a:t> </a:t>
+            </a:r>
+            <a:r>
+              <a:rPr lang="sv-SE" sz="1200" i="1" kern="1200" dirty="0" err="1" smtClean="0">
+                <a:solidFill>
+                  <a:schemeClr val="tx1"/>
+                </a:solidFill>
+                <a:effectLst/>
+                <a:latin typeface="+mn-lt"/>
+                <a:ea typeface="+mn-ea"/>
+                <a:cs typeface="+mn-cs"/>
+              </a:rPr>
+              <a:t>Bedömning</a:t>
+            </a:r>
+            <a:r>
+              <a:rPr lang="sv-SE" sz="1200" i="1" kern="1200" dirty="0" smtClean="0">
+                <a:solidFill>
+                  <a:schemeClr val="tx1"/>
+                </a:solidFill>
+                <a:effectLst/>
+                <a:latin typeface="+mn-lt"/>
+                <a:ea typeface="+mn-ea"/>
+                <a:cs typeface="+mn-cs"/>
+              </a:rPr>
+              <a:t> och </a:t>
+            </a:r>
+            <a:r>
+              <a:rPr lang="sv-SE" sz="1200" i="1" kern="1200" dirty="0" err="1" smtClean="0">
+                <a:solidFill>
+                  <a:schemeClr val="tx1"/>
+                </a:solidFill>
+                <a:effectLst/>
+                <a:latin typeface="+mn-lt"/>
+                <a:ea typeface="+mn-ea"/>
+                <a:cs typeface="+mn-cs"/>
+              </a:rPr>
+              <a:t>Utvärdering-</a:t>
+            </a:r>
+            <a:r>
+              <a:rPr lang="sv-SE" sz="1200" kern="1200" dirty="0" err="1" smtClean="0">
+                <a:solidFill>
+                  <a:schemeClr val="tx1"/>
+                </a:solidFill>
+                <a:effectLst/>
+                <a:latin typeface="+mn-lt"/>
+                <a:ea typeface="+mn-ea"/>
+                <a:cs typeface="+mn-cs"/>
+              </a:rPr>
+              <a:t>fasen</a:t>
+            </a:r>
+            <a:r>
+              <a:rPr lang="sv-SE" sz="1200" kern="1200" dirty="0" smtClean="0">
+                <a:solidFill>
+                  <a:schemeClr val="tx1"/>
+                </a:solidFill>
+                <a:effectLst/>
+                <a:latin typeface="+mn-lt"/>
+                <a:ea typeface="+mn-ea"/>
+                <a:cs typeface="+mn-cs"/>
+              </a:rPr>
+              <a:t> </a:t>
+            </a:r>
+            <a:r>
+              <a:rPr lang="sv-SE" sz="1200" kern="1200" dirty="0" err="1" smtClean="0">
+                <a:solidFill>
+                  <a:schemeClr val="tx1"/>
+                </a:solidFill>
+                <a:effectLst/>
+                <a:latin typeface="+mn-lt"/>
+                <a:ea typeface="+mn-ea"/>
+                <a:cs typeface="+mn-cs"/>
+              </a:rPr>
+              <a:t>bör</a:t>
+            </a:r>
+            <a:r>
+              <a:rPr lang="sv-SE" sz="1200" kern="1200" dirty="0" smtClean="0">
+                <a:solidFill>
+                  <a:schemeClr val="tx1"/>
+                </a:solidFill>
+                <a:effectLst/>
+                <a:latin typeface="+mn-lt"/>
+                <a:ea typeface="+mn-ea"/>
+                <a:cs typeface="+mn-cs"/>
+              </a:rPr>
+              <a:t> prioriteras.</a:t>
+            </a:r>
+            <a:endParaRPr lang="sv-SE" dirty="0" smtClean="0"/>
+          </a:p>
+          <a:p>
+            <a:endParaRPr lang="sv-SE" dirty="0" smtClean="0"/>
+          </a:p>
+          <a:p>
+            <a:r>
+              <a:rPr lang="sv-SE" dirty="0" err="1" smtClean="0"/>
+              <a:t>Summarize</a:t>
+            </a:r>
+            <a:r>
+              <a:rPr lang="sv-SE" dirty="0" smtClean="0"/>
+              <a:t> </a:t>
+            </a:r>
+            <a:r>
+              <a:rPr lang="sv-SE" dirty="0" err="1" smtClean="0"/>
+              <a:t>results</a:t>
+            </a:r>
+            <a:r>
+              <a:rPr lang="sv-SE" dirty="0" smtClean="0"/>
+              <a:t> and </a:t>
+            </a:r>
+            <a:r>
+              <a:rPr lang="sv-SE" dirty="0" err="1" smtClean="0"/>
+              <a:t>add</a:t>
+            </a:r>
+            <a:r>
+              <a:rPr lang="sv-SE" dirty="0" smtClean="0"/>
+              <a:t> </a:t>
+            </a:r>
+            <a:r>
+              <a:rPr lang="sv-SE" dirty="0" err="1" smtClean="0"/>
+              <a:t>conclusions</a:t>
+            </a:r>
+            <a:r>
+              <a:rPr lang="sv-SE" dirty="0" smtClean="0"/>
+              <a:t> for utvärdering</a:t>
+            </a:r>
+            <a:endParaRPr lang="sv-SE" dirty="0"/>
+          </a:p>
+        </p:txBody>
+      </p:sp>
+      <p:sp>
+        <p:nvSpPr>
+          <p:cNvPr id="4" name="Platshållare för bildnummer 3"/>
+          <p:cNvSpPr>
+            <a:spLocks noGrp="1"/>
+          </p:cNvSpPr>
+          <p:nvPr>
+            <p:ph type="sldNum" sz="quarter" idx="10"/>
+          </p:nvPr>
+        </p:nvSpPr>
+        <p:spPr/>
+        <p:txBody>
+          <a:bodyPr/>
+          <a:lstStyle/>
+          <a:p>
+            <a:fld id="{37FE1B89-C8F8-664A-A32D-5606C0AF9B96}" type="slidenum">
+              <a:rPr lang="sv-SE" smtClean="0"/>
+              <a:t>13</a:t>
+            </a:fld>
+            <a:endParaRPr lang="sv-SE"/>
+          </a:p>
+        </p:txBody>
+      </p:sp>
+    </p:spTree>
+    <p:extLst>
+      <p:ext uri="{BB962C8B-B14F-4D97-AF65-F5344CB8AC3E}">
+        <p14:creationId xmlns:p14="http://schemas.microsoft.com/office/powerpoint/2010/main" val="340287731"/>
+      </p:ext>
+    </p:extLst>
+  </p:cSld>
+  <p:clrMapOvr>
+    <a:masterClrMapping/>
+  </p:clrMapOvr>
+</p:notes>
+</file>
+
+<file path=ppt/notesSlides/notesSlide13.xml><?xml version="1.0" encoding="utf-8"?>
+<p:notes xmlns:a="http://schemas.openxmlformats.org/drawingml/2006/main" xmlns:r="http://schemas.openxmlformats.org/officeDocument/2006/relationships" xmlns:p="http://schemas.openxmlformats.org/presentationml/2006/main">
+  <p:cSld>
+    <p:spTree>
+      <p:nvGrpSpPr>
+        <p:cNvPr id="1" name=""/>
+        <p:cNvGrpSpPr/>
+        <p:nvPr/>
+      </p:nvGrpSpPr>
+      <p:grpSpPr>
+        <a:xfrm>
+          <a:off x="0" y="0"/>
+          <a:ext cx="0" cy="0"/>
+          <a:chOff x="0" y="0"/>
+          <a:chExt cx="0" cy="0"/>
+        </a:xfrm>
+      </p:grpSpPr>
+      <p:sp>
+        <p:nvSpPr>
+          <p:cNvPr id="2" name="Platshållare för bildobjekt 1"/>
+          <p:cNvSpPr>
+            <a:spLocks noGrp="1" noRot="1" noChangeAspect="1"/>
+          </p:cNvSpPr>
+          <p:nvPr>
+            <p:ph type="sldImg"/>
+          </p:nvPr>
+        </p:nvSpPr>
+        <p:spPr/>
+      </p:sp>
+      <p:sp>
+        <p:nvSpPr>
+          <p:cNvPr id="3" name="Platshållare för anteckningar 2"/>
+          <p:cNvSpPr>
+            <a:spLocks noGrp="1"/>
+          </p:cNvSpPr>
+          <p:nvPr>
+            <p:ph type="body" idx="1"/>
+          </p:nvPr>
+        </p:nvSpPr>
+        <p:spPr/>
+        <p:txBody>
+          <a:bodyPr/>
+          <a:lstStyle/>
+          <a:p>
+            <a:r>
+              <a:rPr lang="sv-SE" sz="1200" kern="1200" dirty="0" smtClean="0">
+                <a:solidFill>
+                  <a:schemeClr val="tx1"/>
+                </a:solidFill>
+                <a:effectLst/>
+                <a:latin typeface="+mn-lt"/>
+                <a:ea typeface="+mn-ea"/>
+                <a:cs typeface="+mn-cs"/>
+              </a:rPr>
+              <a:t>Resultatet visade att DIM och, följaktligen, det Associativa perspektivet var </a:t>
+            </a:r>
+            <a:r>
+              <a:rPr lang="sv-SE" sz="1200" kern="1200" dirty="0" err="1" smtClean="0">
+                <a:solidFill>
+                  <a:schemeClr val="tx1"/>
+                </a:solidFill>
+                <a:effectLst/>
+                <a:latin typeface="+mn-lt"/>
+                <a:ea typeface="+mn-ea"/>
+                <a:cs typeface="+mn-cs"/>
+              </a:rPr>
+              <a:t>lämpligast</a:t>
+            </a:r>
+            <a:r>
+              <a:rPr lang="sv-SE" sz="1200" kern="1200" dirty="0" smtClean="0">
+                <a:solidFill>
+                  <a:schemeClr val="tx1"/>
+                </a:solidFill>
+                <a:effectLst/>
+                <a:latin typeface="+mn-lt"/>
+                <a:ea typeface="+mn-ea"/>
+                <a:cs typeface="+mn-cs"/>
+              </a:rPr>
+              <a:t> </a:t>
+            </a:r>
+            <a:r>
+              <a:rPr lang="sv-SE" sz="1200" kern="1200" dirty="0" err="1" smtClean="0">
+                <a:solidFill>
+                  <a:schemeClr val="tx1"/>
+                </a:solidFill>
+                <a:effectLst/>
+                <a:latin typeface="+mn-lt"/>
+                <a:ea typeface="+mn-ea"/>
+                <a:cs typeface="+mn-cs"/>
+              </a:rPr>
+              <a:t>för</a:t>
+            </a:r>
+            <a:r>
+              <a:rPr lang="sv-SE" sz="1200" kern="1200" dirty="0" smtClean="0">
+                <a:solidFill>
+                  <a:schemeClr val="tx1"/>
+                </a:solidFill>
+                <a:effectLst/>
+                <a:latin typeface="+mn-lt"/>
+                <a:ea typeface="+mn-ea"/>
+                <a:cs typeface="+mn-cs"/>
+              </a:rPr>
+              <a:t> att passa in med Grades pedagogiska riktlinjer. </a:t>
+            </a:r>
+            <a:endParaRPr lang="sv-SE" dirty="0" smtClean="0">
+              <a:effectLst/>
+            </a:endParaRPr>
+          </a:p>
+          <a:p>
+            <a:endParaRPr lang="sv-SE" dirty="0" smtClean="0"/>
+          </a:p>
+          <a:p>
+            <a:r>
+              <a:rPr lang="sv-SE" sz="1200" kern="1200" dirty="0" smtClean="0">
+                <a:solidFill>
+                  <a:schemeClr val="tx1"/>
+                </a:solidFill>
+                <a:effectLst/>
+                <a:latin typeface="+mn-lt"/>
+                <a:ea typeface="+mn-ea"/>
+                <a:cs typeface="+mn-cs"/>
+              </a:rPr>
+              <a:t>Sammanfattningsvis ger resultatet </a:t>
+            </a:r>
+            <a:r>
+              <a:rPr lang="sv-SE" sz="1200" kern="1200" dirty="0" err="1" smtClean="0">
+                <a:solidFill>
+                  <a:schemeClr val="tx1"/>
+                </a:solidFill>
+                <a:effectLst/>
+                <a:latin typeface="+mn-lt"/>
+                <a:ea typeface="+mn-ea"/>
+                <a:cs typeface="+mn-cs"/>
+              </a:rPr>
+              <a:t>från</a:t>
+            </a:r>
+            <a:r>
+              <a:rPr lang="sv-SE" sz="1200" kern="1200" dirty="0" smtClean="0">
+                <a:solidFill>
+                  <a:schemeClr val="tx1"/>
+                </a:solidFill>
+                <a:effectLst/>
+                <a:latin typeface="+mn-lt"/>
+                <a:ea typeface="+mn-ea"/>
+                <a:cs typeface="+mn-cs"/>
+              </a:rPr>
+              <a:t> studien en tydlig riktlinje </a:t>
+            </a:r>
+            <a:r>
+              <a:rPr lang="sv-SE" sz="1200" kern="1200" dirty="0" err="1" smtClean="0">
+                <a:solidFill>
+                  <a:schemeClr val="tx1"/>
+                </a:solidFill>
+                <a:effectLst/>
+                <a:latin typeface="+mn-lt"/>
+                <a:ea typeface="+mn-ea"/>
+                <a:cs typeface="+mn-cs"/>
+              </a:rPr>
+              <a:t>för</a:t>
+            </a:r>
+            <a:r>
+              <a:rPr lang="sv-SE" sz="1200" kern="1200" dirty="0" smtClean="0">
+                <a:solidFill>
+                  <a:schemeClr val="tx1"/>
+                </a:solidFill>
+                <a:effectLst/>
+                <a:latin typeface="+mn-lt"/>
+                <a:ea typeface="+mn-ea"/>
+                <a:cs typeface="+mn-cs"/>
+              </a:rPr>
+              <a:t> modeller som skulle </a:t>
+            </a:r>
+            <a:r>
+              <a:rPr lang="sv-SE" sz="1200" kern="1200" dirty="0" err="1" smtClean="0">
+                <a:solidFill>
+                  <a:schemeClr val="tx1"/>
+                </a:solidFill>
+                <a:effectLst/>
+                <a:latin typeface="+mn-lt"/>
+                <a:ea typeface="+mn-ea"/>
+                <a:cs typeface="+mn-cs"/>
+              </a:rPr>
+              <a:t>underlätta</a:t>
+            </a:r>
+            <a:r>
+              <a:rPr lang="sv-SE" sz="1200" kern="1200" dirty="0" smtClean="0">
+                <a:solidFill>
+                  <a:schemeClr val="tx1"/>
+                </a:solidFill>
+                <a:effectLst/>
+                <a:latin typeface="+mn-lt"/>
+                <a:ea typeface="+mn-ea"/>
+                <a:cs typeface="+mn-cs"/>
+              </a:rPr>
+              <a:t> Grades </a:t>
+            </a:r>
+            <a:r>
+              <a:rPr lang="sv-SE" sz="1200" kern="1200" dirty="0" err="1" smtClean="0">
+                <a:solidFill>
+                  <a:schemeClr val="tx1"/>
+                </a:solidFill>
+                <a:effectLst/>
+                <a:latin typeface="+mn-lt"/>
+                <a:ea typeface="+mn-ea"/>
+                <a:cs typeface="+mn-cs"/>
+              </a:rPr>
+              <a:t>övergång</a:t>
+            </a:r>
+            <a:r>
+              <a:rPr lang="sv-SE" sz="1200" kern="1200" dirty="0" smtClean="0">
+                <a:solidFill>
+                  <a:schemeClr val="tx1"/>
+                </a:solidFill>
+                <a:effectLst/>
+                <a:latin typeface="+mn-lt"/>
+                <a:ea typeface="+mn-ea"/>
+                <a:cs typeface="+mn-cs"/>
+              </a:rPr>
+              <a:t> till en modellbaserat strategi. Samtidigt identifieras </a:t>
+            </a:r>
+            <a:r>
+              <a:rPr lang="sv-SE" sz="1200" kern="1200" dirty="0" err="1" smtClean="0">
+                <a:solidFill>
+                  <a:schemeClr val="tx1"/>
+                </a:solidFill>
+                <a:effectLst/>
+                <a:latin typeface="+mn-lt"/>
+                <a:ea typeface="+mn-ea"/>
+                <a:cs typeface="+mn-cs"/>
+              </a:rPr>
+              <a:t>för</a:t>
+            </a:r>
+            <a:r>
+              <a:rPr lang="sv-SE" sz="1200" kern="1200" dirty="0" smtClean="0">
+                <a:solidFill>
+                  <a:schemeClr val="tx1"/>
+                </a:solidFill>
+                <a:effectLst/>
+                <a:latin typeface="+mn-lt"/>
+                <a:ea typeface="+mn-ea"/>
+                <a:cs typeface="+mn-cs"/>
+              </a:rPr>
+              <a:t>- och nackdelar med Grades nuvarande pedagogiska riktlinjer, enligt DIM. Studien </a:t>
+            </a:r>
+            <a:r>
+              <a:rPr lang="sv-SE" sz="1200" kern="1200" dirty="0" err="1" smtClean="0">
+                <a:solidFill>
+                  <a:schemeClr val="tx1"/>
+                </a:solidFill>
+                <a:effectLst/>
+                <a:latin typeface="+mn-lt"/>
+                <a:ea typeface="+mn-ea"/>
+                <a:cs typeface="+mn-cs"/>
+              </a:rPr>
+              <a:t>påpekar</a:t>
+            </a:r>
+            <a:r>
+              <a:rPr lang="sv-SE" sz="1200" kern="1200" dirty="0" smtClean="0">
+                <a:solidFill>
+                  <a:schemeClr val="tx1"/>
+                </a:solidFill>
+                <a:effectLst/>
+                <a:latin typeface="+mn-lt"/>
+                <a:ea typeface="+mn-ea"/>
+                <a:cs typeface="+mn-cs"/>
+              </a:rPr>
+              <a:t> </a:t>
+            </a:r>
+            <a:r>
+              <a:rPr lang="sv-SE" sz="1200" kern="1200" dirty="0" err="1" smtClean="0">
+                <a:solidFill>
+                  <a:schemeClr val="tx1"/>
+                </a:solidFill>
+                <a:effectLst/>
+                <a:latin typeface="+mn-lt"/>
+                <a:ea typeface="+mn-ea"/>
+                <a:cs typeface="+mn-cs"/>
+              </a:rPr>
+              <a:t>fördelar</a:t>
+            </a:r>
+            <a:r>
+              <a:rPr lang="sv-SE" sz="1200" kern="1200" dirty="0" smtClean="0">
+                <a:solidFill>
+                  <a:schemeClr val="tx1"/>
+                </a:solidFill>
+                <a:effectLst/>
+                <a:latin typeface="+mn-lt"/>
+                <a:ea typeface="+mn-ea"/>
+                <a:cs typeface="+mn-cs"/>
+              </a:rPr>
+              <a:t> samtidigt som den ger specifika </a:t>
+            </a:r>
+            <a:r>
+              <a:rPr lang="sv-SE" sz="1200" kern="1200" dirty="0" err="1" smtClean="0">
+                <a:solidFill>
+                  <a:schemeClr val="tx1"/>
+                </a:solidFill>
+                <a:effectLst/>
+                <a:latin typeface="+mn-lt"/>
+                <a:ea typeface="+mn-ea"/>
+                <a:cs typeface="+mn-cs"/>
+              </a:rPr>
+              <a:t>förslag</a:t>
+            </a:r>
+            <a:r>
+              <a:rPr lang="sv-SE" sz="1200" kern="1200" dirty="0" smtClean="0">
+                <a:solidFill>
+                  <a:schemeClr val="tx1"/>
+                </a:solidFill>
+                <a:effectLst/>
+                <a:latin typeface="+mn-lt"/>
+                <a:ea typeface="+mn-ea"/>
+                <a:cs typeface="+mn-cs"/>
+              </a:rPr>
+              <a:t> på̊ </a:t>
+            </a:r>
+            <a:r>
+              <a:rPr lang="sv-SE" sz="1200" kern="1200" dirty="0" err="1" smtClean="0">
+                <a:solidFill>
+                  <a:schemeClr val="tx1"/>
+                </a:solidFill>
+                <a:effectLst/>
+                <a:latin typeface="+mn-lt"/>
+                <a:ea typeface="+mn-ea"/>
+                <a:cs typeface="+mn-cs"/>
+              </a:rPr>
+              <a:t>förbättringar</a:t>
+            </a:r>
+            <a:r>
+              <a:rPr lang="sv-SE" sz="1200" kern="1200" dirty="0" smtClean="0">
+                <a:solidFill>
+                  <a:schemeClr val="tx1"/>
+                </a:solidFill>
+                <a:effectLst/>
+                <a:latin typeface="+mn-lt"/>
+                <a:ea typeface="+mn-ea"/>
+                <a:cs typeface="+mn-cs"/>
+              </a:rPr>
+              <a:t>. Slutligen </a:t>
+            </a:r>
+            <a:r>
+              <a:rPr lang="sv-SE" sz="1200" kern="1200" dirty="0" err="1" smtClean="0">
+                <a:solidFill>
+                  <a:schemeClr val="tx1"/>
+                </a:solidFill>
+                <a:effectLst/>
+                <a:latin typeface="+mn-lt"/>
+                <a:ea typeface="+mn-ea"/>
+                <a:cs typeface="+mn-cs"/>
+              </a:rPr>
+              <a:t>kartlägger</a:t>
+            </a:r>
+            <a:r>
+              <a:rPr lang="sv-SE" sz="1200" kern="1200" dirty="0" smtClean="0">
+                <a:solidFill>
+                  <a:schemeClr val="tx1"/>
+                </a:solidFill>
+                <a:effectLst/>
+                <a:latin typeface="+mn-lt"/>
+                <a:ea typeface="+mn-ea"/>
+                <a:cs typeface="+mn-cs"/>
+              </a:rPr>
+              <a:t> detta arbete en </a:t>
+            </a:r>
+            <a:r>
+              <a:rPr lang="sv-SE" sz="1200" kern="1200" dirty="0" err="1" smtClean="0">
+                <a:solidFill>
+                  <a:schemeClr val="tx1"/>
+                </a:solidFill>
+                <a:effectLst/>
+                <a:latin typeface="+mn-lt"/>
+                <a:ea typeface="+mn-ea"/>
+                <a:cs typeface="+mn-cs"/>
+              </a:rPr>
+              <a:t>möjlig</a:t>
+            </a:r>
+            <a:r>
+              <a:rPr lang="sv-SE" sz="1200" kern="1200" dirty="0" smtClean="0">
+                <a:solidFill>
+                  <a:schemeClr val="tx1"/>
+                </a:solidFill>
+                <a:effectLst/>
+                <a:latin typeface="+mn-lt"/>
+                <a:ea typeface="+mn-ea"/>
+                <a:cs typeface="+mn-cs"/>
+              </a:rPr>
+              <a:t> forskningsstrategi </a:t>
+            </a:r>
+            <a:r>
+              <a:rPr lang="sv-SE" sz="1200" kern="1200" dirty="0" err="1" smtClean="0">
+                <a:solidFill>
+                  <a:schemeClr val="tx1"/>
+                </a:solidFill>
+                <a:effectLst/>
+                <a:latin typeface="+mn-lt"/>
+                <a:ea typeface="+mn-ea"/>
+                <a:cs typeface="+mn-cs"/>
+              </a:rPr>
+              <a:t>för</a:t>
+            </a:r>
+            <a:r>
+              <a:rPr lang="sv-SE" sz="1200" kern="1200" dirty="0" smtClean="0">
+                <a:solidFill>
+                  <a:schemeClr val="tx1"/>
+                </a:solidFill>
+                <a:effectLst/>
+                <a:latin typeface="+mn-lt"/>
+                <a:ea typeface="+mn-ea"/>
+                <a:cs typeface="+mn-cs"/>
+              </a:rPr>
+              <a:t> hur pedagogiska modeller kan evalueras hos ELF. </a:t>
+            </a:r>
+            <a:endParaRPr lang="sv-SE" dirty="0" smtClean="0">
+              <a:effectLst/>
+            </a:endParaRPr>
+          </a:p>
+          <a:p>
+            <a:endParaRPr lang="sv-SE" dirty="0" smtClean="0"/>
+          </a:p>
+          <a:p>
+            <a:endParaRPr lang="sv-SE" dirty="0" smtClean="0"/>
+          </a:p>
+          <a:p>
+            <a:r>
               <a:rPr lang="sv-SE" dirty="0" err="1" smtClean="0"/>
               <a:t>Summary</a:t>
             </a:r>
             <a:r>
               <a:rPr lang="sv-SE" dirty="0" smtClean="0"/>
-              <a:t> and </a:t>
+              <a:t> </a:t>
+            </a:r>
+            <a:r>
+              <a:rPr lang="sv-SE" dirty="0" smtClean="0"/>
+              <a:t>and </a:t>
             </a:r>
             <a:r>
               <a:rPr lang="sv-SE" dirty="0" err="1" smtClean="0"/>
@@ -1313,8 +4479,25 @@
                 <a:latin typeface="Times New Roman"/>
                 <a:cs typeface="Times New Roman"/>
               </a:rPr>
-              <a:t> e-kurser i 20 år här i Stockholm och i Lund. </a:t>
-            </a:r>
+              <a:t> e-kurser i 20 år här i </a:t>
+            </a:r>
+            <a:r>
+              <a:rPr lang="sv-SE" sz="1200" baseline="0" dirty="0" smtClean="0">
+                <a:solidFill>
+                  <a:srgbClr val="17375E"/>
+                </a:solidFill>
+                <a:latin typeface="Times New Roman"/>
+                <a:cs typeface="Times New Roman"/>
+              </a:rPr>
+              <a:t>Stockholm. </a:t>
+            </a:r>
+            <a:endParaRPr lang="sv-SE" sz="1200" baseline="0" dirty="0" smtClean="0">
+              <a:solidFill>
+                <a:srgbClr val="17375E"/>
+              </a:solidFill>
+              <a:latin typeface="Times New Roman"/>
+              <a:cs typeface="Times New Roman"/>
+            </a:endParaRPr>
           </a:p>
           <a:p>
             <a:pPr marL="171450" indent="-171450">
@@ -1381,11 +4564,7 @@
             </a:pPr>
             <a:r>
               <a:rPr lang="sv-SE" dirty="0" smtClean="0"/>
-              <a:t>in </a:t>
-            </a:r>
-            <a:r>
-              <a:rPr lang="sv-SE" dirty="0" smtClean="0"/>
-              <a:t>Stockholm Grade</a:t>
+              <a:t>in Stockholm Grade</a:t>
             </a:r>
             <a:r>
               <a:rPr lang="sv-SE" baseline="0" dirty="0" smtClean="0"/>
@@ -1890,11 +5069,7 @@
             </a:r>
             <a:r>
               <a:rPr lang="sv-SE" baseline="0" dirty="0" smtClean="0"/>
-              <a:t> </a:t>
-            </a:r>
-            <a:r>
-              <a:rPr lang="sv-SE" baseline="0" dirty="0" smtClean="0"/>
-              <a:t>1) </a:t>
+              <a:t> 1) </a:t>
             </a:r>
             <a:r>
               <a:rPr lang="sv-SE" baseline="0" dirty="0" err="1" smtClean="0"/>
@@ -2084,7 +5259,23 @@
           <a:p>
             <a:r>
               <a:rPr lang="sv-SE" baseline="0" dirty="0" smtClean="0"/>
-              <a:t>- För att sen intervju den pedagogiska ansvarige hos Grade och kunna dra en slutsats vilket perspektiv passande modell som speglar Grade nuvarande riktlinjer.</a:t>
+              <a:t>- För att sen </a:t>
+            </a:r>
+            <a:r>
+              <a:rPr lang="sv-SE" baseline="0" dirty="0" smtClean="0"/>
+              <a:t>intervjua </a:t>
+            </a:r>
+            <a:r>
+              <a:rPr lang="sv-SE" baseline="0" dirty="0" smtClean="0"/>
+              <a:t>den pedagogiska ansvarige hos Grade och kunna dra en slutsats vilket </a:t>
+            </a:r>
+            <a:r>
+              <a:rPr lang="sv-SE" baseline="0" dirty="0" smtClean="0"/>
+              <a:t>perspektiv och </a:t>
+            </a:r>
+            <a:r>
+              <a:rPr lang="sv-SE" baseline="0" dirty="0" smtClean="0"/>
+              <a:t>passande modell som speglar Grade nuvarande riktlinjer.</a:t>
             </a:r>
             <a:endParaRPr lang="sv-SE" dirty="0" smtClean="0"/>
           </a:p>
@@ -2188,11 +5379,7 @@
           <a:p>
             <a:r>
               <a:rPr lang="sv-SE" dirty="0" smtClean="0"/>
-              <a:t>Koppla </a:t>
-            </a:r>
-            <a:r>
-              <a:rPr lang="sv-SE" dirty="0" smtClean="0"/>
-              <a:t>syfte/mål</a:t>
+              <a:t>Koppla syfte/mål</a:t>
             </a:r>
             <a:r>
               <a:rPr lang="sv-SE" baseline="0" dirty="0" smtClean="0"/>
@@ -2284,7 +5471,11 @@
           <a:p>
             <a:r>
               <a:rPr lang="sv-SE" dirty="0" smtClean="0"/>
-              <a:t>Meningen med att intervjua</a:t>
+              <a:t>Ändamålet med </a:t>
+            </a:r>
+            <a:r>
+              <a:rPr lang="sv-SE" dirty="0" smtClean="0"/>
+              <a:t>att intervjua</a:t>
             </a:r>
             <a:r>
               <a:rPr lang="sv-SE" baseline="0" dirty="0" smtClean="0"/>
@@ -2935,17 +6126,507 @@
           <a:bodyPr/>
           <a:lstStyle/>
           <a:p>
+            <a:pPr marL="228600" indent="-228600">
+              <a:buAutoNum type="arabicParenR"/>
+            </a:pPr>
+            <a:r>
+              <a:rPr lang="sv-SE" baseline="0" dirty="0" smtClean="0"/>
+              <a:t>Figuren visar faser från vardera modell och intervjufrågornas </a:t>
+            </a:r>
+            <a:r>
+              <a:rPr lang="sv-SE" baseline="0" dirty="0" err="1" smtClean="0"/>
+              <a:t>indentfieringsnummer</a:t>
+            </a:r>
+            <a:r>
+              <a:rPr lang="sv-SE" baseline="0" dirty="0" smtClean="0"/>
+              <a:t> </a:t>
+            </a:r>
+            <a:r>
+              <a:rPr lang="sv-SE" sz="1200" kern="1200" dirty="0" smtClean="0">
+                <a:solidFill>
+                  <a:schemeClr val="tx1"/>
+                </a:solidFill>
+                <a:effectLst/>
+                <a:latin typeface="+mn-lt"/>
+                <a:ea typeface="+mn-ea"/>
+                <a:cs typeface="+mn-cs"/>
+              </a:rPr>
+              <a:t>Diagramstaplarna visar de tilldelade poäng uppdelade efter element. Identifieringsnummer korresponderar med numrering av intervjufrågorna i bilaga 2.</a:t>
+            </a:r>
+          </a:p>
+          <a:p>
+            <a:pPr marL="228600" indent="-228600">
+              <a:buAutoNum type="arabicParenR"/>
+            </a:pPr>
+            <a:r>
+              <a:rPr lang="sv-SE" sz="1200" kern="1200" dirty="0" smtClean="0">
+                <a:solidFill>
+                  <a:schemeClr val="tx1"/>
+                </a:solidFill>
+                <a:effectLst/>
+                <a:latin typeface="+mn-lt"/>
+                <a:ea typeface="+mn-ea"/>
+                <a:cs typeface="+mn-cs"/>
+              </a:rPr>
+              <a:t>Genom att analysera intervjuresultatet </a:t>
+            </a:r>
+            <a:r>
+              <a:rPr lang="sv-SE" sz="1200" kern="1200" dirty="0" err="1" smtClean="0">
+                <a:solidFill>
+                  <a:schemeClr val="tx1"/>
+                </a:solidFill>
+                <a:effectLst/>
+                <a:latin typeface="+mn-lt"/>
+                <a:ea typeface="+mn-ea"/>
+                <a:cs typeface="+mn-cs"/>
+              </a:rPr>
+              <a:t>från</a:t>
+            </a:r>
+            <a:r>
+              <a:rPr lang="sv-SE" sz="1200" kern="1200" dirty="0" smtClean="0">
+                <a:solidFill>
+                  <a:schemeClr val="tx1"/>
+                </a:solidFill>
+                <a:effectLst/>
+                <a:latin typeface="+mn-lt"/>
+                <a:ea typeface="+mn-ea"/>
+                <a:cs typeface="+mn-cs"/>
+              </a:rPr>
+              <a:t> varje enskilt modellelement, </a:t>
+            </a:r>
+            <a:r>
+              <a:rPr lang="sv-SE" sz="1200" kern="1200" dirty="0" err="1" smtClean="0">
+                <a:solidFill>
+                  <a:schemeClr val="tx1"/>
+                </a:solidFill>
+                <a:effectLst/>
+                <a:latin typeface="+mn-lt"/>
+                <a:ea typeface="+mn-ea"/>
+                <a:cs typeface="+mn-cs"/>
+              </a:rPr>
+              <a:t>framträder</a:t>
+            </a:r>
+            <a:r>
+              <a:rPr lang="sv-SE" sz="1200" kern="1200" dirty="0" smtClean="0">
+                <a:solidFill>
+                  <a:schemeClr val="tx1"/>
+                </a:solidFill>
+                <a:effectLst/>
+                <a:latin typeface="+mn-lt"/>
+                <a:ea typeface="+mn-ea"/>
+                <a:cs typeface="+mn-cs"/>
+              </a:rPr>
+              <a:t> det att DIM hade en konstant </a:t>
+            </a:r>
+            <a:r>
+              <a:rPr lang="sv-SE" sz="1200" kern="1200" dirty="0" err="1" smtClean="0">
+                <a:solidFill>
+                  <a:schemeClr val="tx1"/>
+                </a:solidFill>
+                <a:effectLst/>
+                <a:latin typeface="+mn-lt"/>
+                <a:ea typeface="+mn-ea"/>
+                <a:cs typeface="+mn-cs"/>
+              </a:rPr>
+              <a:t>hög</a:t>
+            </a:r>
+            <a:r>
+              <a:rPr lang="sv-SE" sz="1200" kern="1200" dirty="0" smtClean="0">
+                <a:solidFill>
+                  <a:schemeClr val="tx1"/>
+                </a:solidFill>
+                <a:effectLst/>
+                <a:latin typeface="+mn-lt"/>
+                <a:ea typeface="+mn-ea"/>
+                <a:cs typeface="+mn-cs"/>
+              </a:rPr>
+              <a:t> </a:t>
+            </a:r>
+            <a:r>
+              <a:rPr lang="sv-SE" sz="1200" kern="1200" dirty="0" err="1" smtClean="0">
+                <a:solidFill>
+                  <a:schemeClr val="tx1"/>
+                </a:solidFill>
+                <a:effectLst/>
+                <a:latin typeface="+mn-lt"/>
+                <a:ea typeface="+mn-ea"/>
+                <a:cs typeface="+mn-cs"/>
+              </a:rPr>
+              <a:t>poäng</a:t>
+            </a:r>
+            <a:r>
+              <a:rPr lang="sv-SE" sz="1200" kern="1200" dirty="0" smtClean="0">
+                <a:solidFill>
+                  <a:schemeClr val="tx1"/>
+                </a:solidFill>
+                <a:effectLst/>
+                <a:latin typeface="+mn-lt"/>
+                <a:ea typeface="+mn-ea"/>
+                <a:cs typeface="+mn-cs"/>
+              </a:rPr>
+              <a:t> </a:t>
+            </a:r>
+            <a:r>
+              <a:rPr lang="sv-SE" sz="1200" kern="1200" dirty="0" err="1" smtClean="0">
+                <a:solidFill>
+                  <a:schemeClr val="tx1"/>
+                </a:solidFill>
+                <a:effectLst/>
+                <a:latin typeface="+mn-lt"/>
+                <a:ea typeface="+mn-ea"/>
+                <a:cs typeface="+mn-cs"/>
+              </a:rPr>
+              <a:t>över</a:t>
+            </a:r>
+            <a:r>
+              <a:rPr lang="sv-SE" sz="1200" kern="1200" dirty="0" smtClean="0">
+                <a:solidFill>
+                  <a:schemeClr val="tx1"/>
+                </a:solidFill>
+                <a:effectLst/>
+                <a:latin typeface="+mn-lt"/>
+                <a:ea typeface="+mn-ea"/>
+                <a:cs typeface="+mn-cs"/>
+              </a:rPr>
+              <a:t> alla element  med den </a:t>
+            </a:r>
+            <a:r>
+              <a:rPr lang="sv-SE" sz="1200" kern="1200" dirty="0" err="1" smtClean="0">
+                <a:solidFill>
+                  <a:schemeClr val="tx1"/>
+                </a:solidFill>
+                <a:effectLst/>
+                <a:latin typeface="+mn-lt"/>
+                <a:ea typeface="+mn-ea"/>
+                <a:cs typeface="+mn-cs"/>
+              </a:rPr>
+              <a:t>högsta</a:t>
+            </a:r>
+            <a:r>
+              <a:rPr lang="sv-SE" sz="1200" kern="1200" dirty="0" smtClean="0">
+                <a:solidFill>
+                  <a:schemeClr val="tx1"/>
+                </a:solidFill>
+                <a:effectLst/>
+                <a:latin typeface="+mn-lt"/>
+                <a:ea typeface="+mn-ea"/>
+                <a:cs typeface="+mn-cs"/>
+              </a:rPr>
+              <a:t> (</a:t>
+            </a:r>
+            <a:r>
+              <a:rPr lang="sv-SE" sz="1200" kern="1200" dirty="0" err="1" smtClean="0">
+                <a:solidFill>
+                  <a:schemeClr val="tx1"/>
+                </a:solidFill>
+                <a:effectLst/>
+                <a:latin typeface="+mn-lt"/>
+                <a:ea typeface="+mn-ea"/>
+                <a:cs typeface="+mn-cs"/>
+              </a:rPr>
+              <a:t>poäng</a:t>
+            </a:r>
+            <a:r>
+              <a:rPr lang="sv-SE" sz="1200" kern="1200" dirty="0" smtClean="0">
+                <a:solidFill>
+                  <a:schemeClr val="tx1"/>
+                </a:solidFill>
+                <a:effectLst/>
+                <a:latin typeface="+mn-lt"/>
+                <a:ea typeface="+mn-ea"/>
+                <a:cs typeface="+mn-cs"/>
+              </a:rPr>
+              <a:t> = 5) eller </a:t>
+            </a:r>
+            <a:r>
+              <a:rPr lang="sv-SE" sz="1200" kern="1200" dirty="0" err="1" smtClean="0">
+                <a:solidFill>
+                  <a:schemeClr val="tx1"/>
+                </a:solidFill>
+                <a:effectLst/>
+                <a:latin typeface="+mn-lt"/>
+                <a:ea typeface="+mn-ea"/>
+                <a:cs typeface="+mn-cs"/>
+              </a:rPr>
+              <a:t>näst</a:t>
+            </a:r>
+            <a:r>
+              <a:rPr lang="sv-SE" sz="1200" kern="1200" dirty="0" smtClean="0">
+                <a:solidFill>
+                  <a:schemeClr val="tx1"/>
+                </a:solidFill>
+                <a:effectLst/>
+                <a:latin typeface="+mn-lt"/>
+                <a:ea typeface="+mn-ea"/>
+                <a:cs typeface="+mn-cs"/>
+              </a:rPr>
+              <a:t> </a:t>
+            </a:r>
+            <a:r>
+              <a:rPr lang="sv-SE" sz="1200" kern="1200" dirty="0" err="1" smtClean="0">
+                <a:solidFill>
+                  <a:schemeClr val="tx1"/>
+                </a:solidFill>
+                <a:effectLst/>
+                <a:latin typeface="+mn-lt"/>
+                <a:ea typeface="+mn-ea"/>
+                <a:cs typeface="+mn-cs"/>
+              </a:rPr>
+              <a:t>högsta</a:t>
+            </a:r>
+            <a:r>
+              <a:rPr lang="sv-SE" sz="1200" kern="1200" dirty="0" smtClean="0">
+                <a:solidFill>
+                  <a:schemeClr val="tx1"/>
+                </a:solidFill>
+                <a:effectLst/>
+                <a:latin typeface="+mn-lt"/>
+                <a:ea typeface="+mn-ea"/>
+                <a:cs typeface="+mn-cs"/>
+              </a:rPr>
+              <a:t> (</a:t>
+            </a:r>
+            <a:r>
+              <a:rPr lang="sv-SE" sz="1200" kern="1200" dirty="0" err="1" smtClean="0">
+                <a:solidFill>
+                  <a:schemeClr val="tx1"/>
+                </a:solidFill>
+                <a:effectLst/>
+                <a:latin typeface="+mn-lt"/>
+                <a:ea typeface="+mn-ea"/>
+                <a:cs typeface="+mn-cs"/>
+              </a:rPr>
+              <a:t>poäng</a:t>
+            </a:r>
+            <a:r>
+              <a:rPr lang="sv-SE" sz="1200" kern="1200" dirty="0" smtClean="0">
+                <a:solidFill>
+                  <a:schemeClr val="tx1"/>
+                </a:solidFill>
+                <a:effectLst/>
+                <a:latin typeface="+mn-lt"/>
+                <a:ea typeface="+mn-ea"/>
+                <a:cs typeface="+mn-cs"/>
+              </a:rPr>
+              <a:t> = 4) </a:t>
+            </a:r>
+            <a:r>
+              <a:rPr lang="sv-SE" sz="1200" kern="1200" dirty="0" err="1" smtClean="0">
+                <a:solidFill>
+                  <a:schemeClr val="tx1"/>
+                </a:solidFill>
+                <a:effectLst/>
+                <a:latin typeface="+mn-lt"/>
+                <a:ea typeface="+mn-ea"/>
+                <a:cs typeface="+mn-cs"/>
+              </a:rPr>
+              <a:t>poängen</a:t>
+            </a:r>
+            <a:r>
+              <a:rPr lang="sv-SE" sz="1200" kern="1200" dirty="0" smtClean="0">
+                <a:solidFill>
+                  <a:schemeClr val="tx1"/>
+                </a:solidFill>
+                <a:effectLst/>
+                <a:latin typeface="+mn-lt"/>
+                <a:ea typeface="+mn-ea"/>
+                <a:cs typeface="+mn-cs"/>
+              </a:rPr>
+              <a:t> i samtliga fall.</a:t>
+            </a:r>
+            <a:r>
+              <a:rPr lang="sv-SE" sz="1200" kern="1200" baseline="0" dirty="0" smtClean="0">
+                <a:solidFill>
+                  <a:schemeClr val="tx1"/>
+                </a:solidFill>
+                <a:effectLst/>
+                <a:latin typeface="+mn-lt"/>
+                <a:ea typeface="+mn-ea"/>
+                <a:cs typeface="+mn-cs"/>
+              </a:rPr>
+              <a:t> </a:t>
+            </a:r>
+          </a:p>
+          <a:p>
+            <a:pPr marL="228600" indent="-228600">
+              <a:buAutoNum type="arabicParenR"/>
+            </a:pPr>
+            <a:r>
+              <a:rPr lang="sv-SE" sz="1200" kern="1200" dirty="0" err="1" smtClean="0">
+                <a:solidFill>
+                  <a:schemeClr val="tx1"/>
+                </a:solidFill>
+                <a:effectLst/>
+                <a:latin typeface="+mn-lt"/>
+                <a:ea typeface="+mn-ea"/>
+                <a:cs typeface="+mn-cs"/>
+              </a:rPr>
+              <a:t>Utifrån</a:t>
+            </a:r>
+            <a:r>
+              <a:rPr lang="sv-SE" sz="1200" kern="1200" dirty="0" smtClean="0">
+                <a:solidFill>
+                  <a:schemeClr val="tx1"/>
+                </a:solidFill>
+                <a:effectLst/>
+                <a:latin typeface="+mn-lt"/>
+                <a:ea typeface="+mn-ea"/>
+                <a:cs typeface="+mn-cs"/>
+              </a:rPr>
+              <a:t> resultatet kan det sammanfattningsvis </a:t>
+            </a:r>
+            <a:r>
+              <a:rPr lang="sv-SE" sz="1200" kern="1200" dirty="0" err="1" smtClean="0">
+                <a:solidFill>
+                  <a:schemeClr val="tx1"/>
+                </a:solidFill>
+                <a:effectLst/>
+                <a:latin typeface="+mn-lt"/>
+                <a:ea typeface="+mn-ea"/>
+                <a:cs typeface="+mn-cs"/>
+              </a:rPr>
+              <a:t>påstås</a:t>
+            </a:r>
+            <a:r>
+              <a:rPr lang="sv-SE" sz="1200" kern="1200" dirty="0" smtClean="0">
+                <a:solidFill>
+                  <a:schemeClr val="tx1"/>
+                </a:solidFill>
+                <a:effectLst/>
+                <a:latin typeface="+mn-lt"/>
+                <a:ea typeface="+mn-ea"/>
+                <a:cs typeface="+mn-cs"/>
+              </a:rPr>
+              <a:t> att DIM passar in </a:t>
+            </a:r>
+            <a:r>
+              <a:rPr lang="sv-SE" sz="1200" kern="1200" dirty="0" err="1" smtClean="0">
+                <a:solidFill>
+                  <a:schemeClr val="tx1"/>
+                </a:solidFill>
+                <a:effectLst/>
+                <a:latin typeface="+mn-lt"/>
+                <a:ea typeface="+mn-ea"/>
+                <a:cs typeface="+mn-cs"/>
+              </a:rPr>
+              <a:t>bäst</a:t>
+            </a:r>
+            <a:r>
+              <a:rPr lang="sv-SE" sz="1200" kern="1200" dirty="0" smtClean="0">
+                <a:solidFill>
+                  <a:schemeClr val="tx1"/>
+                </a:solidFill>
+                <a:effectLst/>
+                <a:latin typeface="+mn-lt"/>
+                <a:ea typeface="+mn-ea"/>
+                <a:cs typeface="+mn-cs"/>
+              </a:rPr>
+              <a:t> </a:t>
+            </a:r>
+            <a:r>
+              <a:rPr lang="sv-SE" sz="1200" kern="1200" dirty="0" err="1" smtClean="0">
+                <a:solidFill>
+                  <a:schemeClr val="tx1"/>
+                </a:solidFill>
+                <a:effectLst/>
+                <a:latin typeface="+mn-lt"/>
+                <a:ea typeface="+mn-ea"/>
+                <a:cs typeface="+mn-cs"/>
+              </a:rPr>
+              <a:t>pa</a:t>
+            </a:r>
+            <a:r>
+              <a:rPr lang="sv-SE" sz="1200" kern="1200" dirty="0" smtClean="0">
+                <a:solidFill>
+                  <a:schemeClr val="tx1"/>
+                </a:solidFill>
+                <a:effectLst/>
+                <a:latin typeface="+mn-lt"/>
+                <a:ea typeface="+mn-ea"/>
+                <a:cs typeface="+mn-cs"/>
+              </a:rPr>
+              <a:t>̊ Grades nuvarande pedagogiska riktlinjer, vilket </a:t>
+            </a:r>
+            <a:r>
+              <a:rPr lang="sv-SE" sz="1200" kern="1200" dirty="0" err="1" smtClean="0">
+                <a:solidFill>
+                  <a:schemeClr val="tx1"/>
+                </a:solidFill>
+                <a:effectLst/>
+                <a:latin typeface="+mn-lt"/>
+                <a:ea typeface="+mn-ea"/>
+                <a:cs typeface="+mn-cs"/>
+              </a:rPr>
+              <a:t>innebär</a:t>
+            </a:r>
+            <a:r>
+              <a:rPr lang="sv-SE" sz="1200" kern="1200" dirty="0" smtClean="0">
+                <a:solidFill>
+                  <a:schemeClr val="tx1"/>
+                </a:solidFill>
+                <a:effectLst/>
+                <a:latin typeface="+mn-lt"/>
+                <a:ea typeface="+mn-ea"/>
+                <a:cs typeface="+mn-cs"/>
+              </a:rPr>
+              <a:t> att det Associativa perspektivet representerar en rimlig </a:t>
+            </a:r>
+            <a:r>
+              <a:rPr lang="sv-SE" sz="1200" kern="1200" dirty="0" err="1" smtClean="0">
+                <a:solidFill>
+                  <a:schemeClr val="tx1"/>
+                </a:solidFill>
+                <a:effectLst/>
+                <a:latin typeface="+mn-lt"/>
+                <a:ea typeface="+mn-ea"/>
+                <a:cs typeface="+mn-cs"/>
+              </a:rPr>
+              <a:t>utgångspunkt</a:t>
+            </a:r>
+            <a:r>
+              <a:rPr lang="sv-SE" sz="1200" kern="1200" dirty="0" smtClean="0">
+                <a:solidFill>
+                  <a:schemeClr val="tx1"/>
+                </a:solidFill>
+                <a:effectLst/>
+                <a:latin typeface="+mn-lt"/>
+                <a:ea typeface="+mn-ea"/>
+                <a:cs typeface="+mn-cs"/>
+              </a:rPr>
+              <a:t> </a:t>
+            </a:r>
+            <a:r>
+              <a:rPr lang="sv-SE" sz="1200" kern="1200" dirty="0" err="1" smtClean="0">
+                <a:solidFill>
+                  <a:schemeClr val="tx1"/>
+                </a:solidFill>
+                <a:effectLst/>
+                <a:latin typeface="+mn-lt"/>
+                <a:ea typeface="+mn-ea"/>
+                <a:cs typeface="+mn-cs"/>
+              </a:rPr>
+              <a:t>för</a:t>
+            </a:r>
+            <a:r>
+              <a:rPr lang="sv-SE" sz="1200" kern="1200" dirty="0" smtClean="0">
+                <a:solidFill>
+                  <a:schemeClr val="tx1"/>
+                </a:solidFill>
+                <a:effectLst/>
+                <a:latin typeface="+mn-lt"/>
+                <a:ea typeface="+mn-ea"/>
+                <a:cs typeface="+mn-cs"/>
+              </a:rPr>
+              <a:t> evaluering av modeller som skulle kunna utnyttjas av Grade i framtiden. </a:t>
+            </a:r>
+            <a:endParaRPr lang="sv-SE" dirty="0" smtClean="0">
+              <a:effectLst/>
+            </a:endParaRPr>
+          </a:p>
+          <a:p>
             <a:pPr marL="0" indent="0">
               <a:buNone/>
             </a:pPr>
-            <a:r>
-              <a:rPr lang="sv-SE" dirty="0" smtClean="0"/>
-              <a:t>1)</a:t>
-            </a:r>
-            <a:r>
-              <a:rPr lang="sv-SE" baseline="0" dirty="0" smtClean="0"/>
-              <a:t> </a:t>
-            </a:r>
             <a:endParaRPr lang="sv-SE" dirty="0" smtClean="0"/>
           </a:p>
           <a:p>
@@ -3105,6 +6786,20 @@
           <a:lstStyle/>
           <a:p>
             <a:r>
+              <a:rPr lang="sv-SE" dirty="0" smtClean="0"/>
+              <a:t>Resultaten visar att det associativa perspektivet och</a:t>
+            </a:r>
+            <a:r>
+              <a:rPr lang="sv-SE" baseline="0" dirty="0" smtClean="0"/>
+              <a:t> DIM har höga poäng och kan därmed ge slutsatsen att passa bäst in på Grades riktlinjer. </a:t>
+            </a:r>
+            <a:endParaRPr lang="sv-SE" dirty="0" smtClean="0"/>
+          </a:p>
+          <a:p>
+            <a:endParaRPr lang="sv-SE" dirty="0" smtClean="0"/>
+          </a:p>
+          <a:p>
+            <a:r>
               <a:rPr lang="sv-SE" dirty="0" err="1" smtClean="0"/>
               <a:t>Summarize</a:t>
             </a:r>
@@ -3242,6 +6937,49 @@
               <a:defRPr/>
             </a:pPr>
             <a:r>
+              <a:rPr lang="sv-SE" baseline="0" dirty="0" smtClean="0"/>
+              <a:t>Meningen med utvärderingsmomenten var att få en djupare inblick inom Grade prestanda i varje fas utifrån DIM. </a:t>
+            </a:r>
+          </a:p>
+          <a:p>
+            <a:pPr marL="0" marR="0" indent="0" algn="l" defTabSz="457200" rtl="0" eaLnBrk="1" fontAlgn="auto" latinLnBrk="0" hangingPunct="1">
+              <a:lnSpc>
+                <a:spcPct val="100000"/>
+              </a:lnSpc>
+              <a:spcBef>
+                <a:spcPts val="0"/>
+              </a:spcBef>
+              <a:spcAft>
+                <a:spcPts val="0"/>
+              </a:spcAft>
+              <a:buClrTx/>
+              <a:buSzTx/>
+              <a:buFontTx/>
+              <a:buNone/>
+              <a:tabLst/>
+              <a:defRPr/>
+            </a:pPr>
+            <a:endParaRPr lang="sv-SE" dirty="0" smtClean="0"/>
+          </a:p>
+          <a:p>
+            <a:pPr marL="0" marR="0" indent="0" algn="l" defTabSz="457200" rtl="0" eaLnBrk="1" fontAlgn="auto" latinLnBrk="0" hangingPunct="1">
+              <a:lnSpc>
+                <a:spcPct val="100000"/>
+              </a:lnSpc>
+              <a:spcBef>
+                <a:spcPts val="0"/>
+              </a:spcBef>
+              <a:spcAft>
+                <a:spcPts val="0"/>
+              </a:spcAft>
+              <a:buClrTx/>
+              <a:buSzTx/>
+              <a:buFontTx/>
+              <a:buNone/>
+              <a:tabLst/>
+              <a:defRPr/>
+            </a:pPr>
+            <a:r>
               <a:rPr lang="sv-SE" dirty="0" err="1" smtClean="0"/>
               <a:t>Important</a:t>
             </a:r>
@@ -3552,7 +7290,7 @@
           <a:p>
             <a:fld id="{A2CCC5B4-AC2E-B041-BC59-4B3EDCDB5E3E}" type="datetimeFigureOut">
               <a:rPr lang="sv-SE" smtClean="0"/>
-              <a:t>19-02-07</a:t>
+              <a:t>19-02-10</a:t>
             </a:fld>
             <a:endParaRPr lang="sv-SE"/>
           </a:p>
@@ -3722,7 +7460,7 @@
           <a:p>
             <a:fld id="{A2CCC5B4-AC2E-B041-BC59-4B3EDCDB5E3E}" type="datetimeFigureOut">
               <a:rPr lang="sv-SE" smtClean="0"/>
-              <a:t>19-02-07</a:t>
+              <a:t>19-02-10</a:t>
             </a:fld>
             <a:endParaRPr lang="sv-SE"/>
           </a:p>
@@ -3902,7 +7640,7 @@
           <a:p>
             <a:fld id="{A2CCC5B4-AC2E-B041-BC59-4B3EDCDB5E3E}" type="datetimeFigureOut">
               <a:rPr lang="sv-SE" smtClean="0"/>
-              <a:t>19-02-07</a:t>
+              <a:t>19-02-10</a:t>
             </a:fld>
             <a:endParaRPr lang="sv-SE"/>
           </a:p>
@@ -4072,7 +7810,7 @@
           <a:p>
             <a:fld id="{A2CCC5B4-AC2E-B041-BC59-4B3EDCDB5E3E}" type="datetimeFigureOut">
               <a:rPr lang="sv-SE" smtClean="0"/>
-              <a:t>19-02-07</a:t>
+              <a:t>19-02-10</a:t>
             </a:fld>
             <a:endParaRPr lang="sv-SE"/>
           </a:p>
@@ -4318,7 +8056,7 @@
           <a:p>
             <a:fld id="{A2CCC5B4-AC2E-B041-BC59-4B3EDCDB5E3E}" type="datetimeFigureOut">
               <a:rPr lang="sv-SE" smtClean="0"/>
-              <a:t>19-02-07</a:t>
+              <a:t>19-02-10</a:t>
             </a:fld>
             <a:endParaRPr lang="sv-SE"/>
           </a:p>
@@ -4606,7 +8344,7 @@
           <a:p>
             <a:fld id="{A2CCC5B4-AC2E-B041-BC59-4B3EDCDB5E3E}" type="datetimeFigureOut">
               <a:rPr lang="sv-SE" smtClean="0"/>
-              <a:t>19-02-07</a:t>
+              <a:t>19-02-10</a:t>
             </a:fld>
             <a:endParaRPr lang="sv-SE"/>
           </a:p>
@@ -5028,7 +8766,7 @@
           <a:p>
             <a:fld id="{A2CCC5B4-AC2E-B041-BC59-4B3EDCDB5E3E}" type="datetimeFigureOut">
               <a:rPr lang="sv-SE" smtClean="0"/>
-              <a:t>19-02-07</a:t>
+              <a:t>19-02-10</a:t>
             </a:fld>
             <a:endParaRPr lang="sv-SE"/>
           </a:p>
@@ -5146,7 +8884,7 @@
           <a:p>
             <a:fld id="{A2CCC5B4-AC2E-B041-BC59-4B3EDCDB5E3E}" type="datetimeFigureOut">
               <a:rPr lang="sv-SE" smtClean="0"/>
-              <a:t>19-02-07</a:t>
+              <a:t>19-02-10</a:t>
             </a:fld>
             <a:endParaRPr lang="sv-SE"/>
           </a:p>
@@ -5241,7 +8979,7 @@
           <a:p>
             <a:fld id="{A2CCC5B4-AC2E-B041-BC59-4B3EDCDB5E3E}" type="datetimeFigureOut">
               <a:rPr lang="sv-SE" smtClean="0"/>
-              <a:t>19-02-07</a:t>
+              <a:t>19-02-10</a:t>
             </a:fld>
             <a:endParaRPr lang="sv-SE"/>
           </a:p>
@@ -5518,7 +9256,7 @@
           <a:p>
             <a:fld id="{A2CCC5B4-AC2E-B041-BC59-4B3EDCDB5E3E}" type="datetimeFigureOut">
               <a:rPr lang="sv-SE" smtClean="0"/>
-              <a:t>19-02-07</a:t>
+              <a:t>19-02-10</a:t>
             </a:fld>
             <a:endParaRPr lang="sv-SE"/>
           </a:p>
@@ -5771,7 +9509,7 @@
           <a:p>
             <a:fld id="{A2CCC5B4-AC2E-B041-BC59-4B3EDCDB5E3E}" type="datetimeFigureOut">
               <a:rPr lang="sv-SE" smtClean="0"/>
-              <a:t>19-02-07</a:t>
+              <a:t>19-02-10</a:t>
             </a:fld>
             <a:endParaRPr lang="sv-SE"/>
           </a:p>
@@ -5984,7 +9722,7 @@
           <a:p>
             <a:fld id="{A2CCC5B4-AC2E-B041-BC59-4B3EDCDB5E3E}" type="datetimeFigureOut">
               <a:rPr lang="sv-SE" smtClean="0"/>
-              <a:t>19-02-07</a:t>
+              <a:t>19-02-10</a:t>
             </a:fld>
             <a:endParaRPr lang="sv-SE"/>
           </a:p>
@@ -6687,22 +10425,29 @@
             <p:ph type="title"/>
           </p:nvPr>
         </p:nvSpPr>
-        <p:spPr/>
+        <p:spPr>
+          <a:xfrm>
+            <a:off x="457200" y="730810"/>
+            <a:ext cx="1712824" cy="699352"/>
+          </a:xfrm>
+        </p:spPr>
         <p:txBody>
-          <a:bodyPr/>
+          <a:bodyPr>
+            <a:normAutofit/>
+          </a:bodyPr>
           <a:lstStyle/>
           <a:p>
             <a:r>
-              <a:rPr lang="sv-SE" dirty="0" smtClean="0">
+              <a:rPr lang="sv-SE" sz="2500" dirty="0" smtClean="0">
                 <a:solidFill>
                   <a:srgbClr val="17375E"/>
                 </a:solidFill>
                 <a:latin typeface="Times New Roman"/>
                 <a:cs typeface="Times New Roman"/>
               </a:rPr>
-              <a:t>Figur 2a</a:t>
-            </a:r>
-            <a:endParaRPr lang="sv-SE" dirty="0">
+              <a:t>Figur 3a</a:t>
+            </a:r>
+            <a:endParaRPr lang="sv-SE" sz="2500" dirty="0">
               <a:solidFill>
                 <a:srgbClr val="17375E"/>
               </a:solidFill>
@@ -6712,25 +10457,34 @@
           </a:p>
         </p:txBody>
       </p:sp>
-      <p:sp>
-        <p:nvSpPr>
-          <p:cNvPr id="3" name="Platshållare för innehåll 2"/>
-          <p:cNvSpPr>
-            <a:spLocks noGrp="1"/>
-          </p:cNvSpPr>
+      <p:pic>
+        <p:nvPicPr>
+          <p:cNvPr id="10" name="Platshållare för innehåll 9" descr="Figure2.png"/>
+          <p:cNvPicPr>
+            <a:picLocks noGrp="1" noChangeAspect="1"/>
+          </p:cNvPicPr>
           <p:nvPr>
             <p:ph idx="1"/>
           </p:nvPr>
-        </p:nvSpPr>
-        <p:spPr/>
-        <p:txBody>
-          <a:bodyPr/>
-          <a:lstStyle/>
-          <a:p>
-            <a:endParaRPr lang="sv-SE" dirty="0"/>
-          </a:p>
-        </p:txBody>
-      </p:sp>
+        </p:nvPicPr>
+        <p:blipFill rotWithShape="1">
+          <a:blip r:embed="rId3">
+            <a:extLst>
+              <a:ext uri="{28A0092B-C50C-407E-A947-70E740481C1C}">
+                <a14:useLocalDpi xmlns:a14="http://schemas.microsoft.com/office/drawing/2010/main" val="0"/>
+              </a:ext>
+            </a:extLst>
+          </a:blip>
+          <a:srcRect t="4223" r="49522" b="2080"/>
+          <a:stretch/>
+        </p:blipFill>
+        <p:spPr>
+          <a:xfrm>
+            <a:off x="1924433" y="1081802"/>
+            <a:ext cx="4735799" cy="5044362"/>
+          </a:xfrm>
+        </p:spPr>
+      </p:pic>
     </p:spTree>
     <p:extLst>
       <p:ext uri="{BB962C8B-B14F-4D97-AF65-F5344CB8AC3E}">
@@ -6771,91 +10525,62 @@
             <p:ph type="title"/>
           </p:nvPr>
         </p:nvSpPr>
-        <p:spPr/>
+        <p:spPr>
+          <a:xfrm>
+            <a:off x="383222" y="643912"/>
+            <a:ext cx="1749813" cy="699352"/>
+          </a:xfrm>
+        </p:spPr>
         <p:txBody>
-          <a:bodyPr/>
+          <a:bodyPr>
+            <a:normAutofit/>
+          </a:bodyPr>
           <a:lstStyle/>
           <a:p>
             <a:r>
-              <a:rPr lang="sv-SE" dirty="0" smtClean="0">
+              <a:rPr lang="sv-SE" sz="2500" dirty="0" smtClean="0">
                 <a:solidFill>
                   <a:srgbClr val="17375E"/>
                 </a:solidFill>
                 <a:latin typeface="Times New Roman"/>
                 <a:cs typeface="Times New Roman"/>
               </a:rPr>
-              <a:t>Figur 2b</a:t>
-            </a:r>
-            <a:endParaRPr lang="sv-SE" dirty="0"/>
+              <a:t>Figur 3b</a:t>
+            </a:r>
+            <a:endParaRPr lang="sv-SE" sz="2500" dirty="0"/>
           </a:p>
         </p:txBody>
       </p:sp>
-      <p:sp>
-        <p:nvSpPr>
-          <p:cNvPr id="3" name="Platshållare för innehåll 2"/>
-          <p:cNvSpPr>
-            <a:spLocks noGrp="1"/>
-          </p:cNvSpPr>
+      <p:pic>
+        <p:nvPicPr>
+          <p:cNvPr id="5" name="Platshållare för innehåll 4" descr="figure2b.pdf"/>
+          <p:cNvPicPr>
+            <a:picLocks noGrp="1" noChangeAspect="1"/>
+          </p:cNvPicPr>
           <p:nvPr>
             <p:ph idx="1"/>
           </p:nvPr>
-        </p:nvSpPr>
-        <p:spPr/>
-        <p:txBody>
-          <a:bodyPr/>
-          <a:lstStyle/>
-          <a:p>
-            <a:r>
-              <a:rPr lang="sv-SE" dirty="0" err="1" smtClean="0"/>
-              <a:t>Say</a:t>
-            </a:r>
-            <a:r>
-              <a:rPr lang="sv-SE" dirty="0" smtClean="0"/>
-              <a:t>: </a:t>
-            </a:r>
-            <a:r>
-              <a:rPr lang="sv-SE" dirty="0" err="1" smtClean="0"/>
-              <a:t>purpose</a:t>
-            </a:r>
-            <a:r>
-              <a:rPr lang="sv-SE" dirty="0" smtClean="0"/>
-              <a:t>, </a:t>
-            </a:r>
-            <a:r>
-              <a:rPr lang="sv-SE" dirty="0" err="1" smtClean="0"/>
-              <a:t>method</a:t>
-            </a:r>
-            <a:r>
-              <a:rPr lang="sv-SE" dirty="0" smtClean="0"/>
-              <a:t>, present </a:t>
-            </a:r>
-            <a:r>
-              <a:rPr lang="sv-SE" dirty="0" err="1" smtClean="0"/>
-              <a:t>result</a:t>
-            </a:r>
-            <a:r>
-              <a:rPr lang="sv-SE" dirty="0" smtClean="0"/>
-              <a:t>, </a:t>
-            </a:r>
-            <a:r>
-              <a:rPr lang="sv-SE" dirty="0" err="1" smtClean="0"/>
-              <a:t>draw</a:t>
-            </a:r>
-            <a:r>
-              <a:rPr lang="sv-SE" dirty="0" smtClean="0"/>
-              <a:t> </a:t>
-            </a:r>
-            <a:r>
-              <a:rPr lang="sv-SE" dirty="0" err="1" smtClean="0"/>
-              <a:t>conclusions</a:t>
-            </a:r>
-            <a:endParaRPr lang="sv-SE" dirty="0" smtClean="0"/>
-          </a:p>
-          <a:p>
-            <a:endParaRPr lang="sv-SE" dirty="0"/>
-          </a:p>
-        </p:txBody>
-      </p:sp>
+        </p:nvPicPr>
+        <p:blipFill>
+          <a:blip r:embed="rId3">
+            <a:extLst>
+              <a:ext uri="{28A0092B-C50C-407E-A947-70E740481C1C}">
+                <a14:useLocalDpi xmlns:a14="http://schemas.microsoft.com/office/drawing/2010/main" val="0"/>
+              </a:ext>
+            </a:extLst>
+          </a:blip>
+          <a:srcRect l="-52895" r="-52895"/>
+          <a:stretch>
+            <a:fillRect/>
+          </a:stretch>
+        </p:blipFill>
+        <p:spPr>
+          <a:xfrm>
+            <a:off x="-404449" y="819917"/>
+            <a:ext cx="9659416" cy="5577483"/>
+          </a:xfrm>
+        </p:spPr>
+      </p:pic>
     </p:spTree>
     <p:extLst>
       <p:ext uri="{BB962C8B-B14F-4D97-AF65-F5344CB8AC3E}">
@@ -7080,106 +10805,6 @@
 </p:sld>
 </file>
 
-<file path=ppt/slides/slide15.xml><?xml version="1.0" encoding="utf-8"?>
-<p:sld xmlns:a="http://schemas.openxmlformats.org/drawingml/2006/main" xmlns:r="http://schemas.openxmlformats.org/officeDocument/2006/relationships" xmlns:p="http://schemas.openxmlformats.org/presentationml/2006/main">
-  <p:cSld>
-    <p:spTree>
-      <p:nvGrpSpPr>
-        <p:cNvPr id="1" name=""/>
-        <p:cNvGrpSpPr/>
-        <p:nvPr/>
-      </p:nvGrpSpPr>
-      <p:grpSpPr>
-        <a:xfrm>
-          <a:off x="0" y="0"/>
-          <a:ext cx="0" cy="0"/>
-          <a:chOff x="0" y="0"/>
-          <a:chExt cx="0" cy="0"/>
-        </a:xfrm>
-      </p:grpSpPr>
-      <p:sp>
-        <p:nvSpPr>
-          <p:cNvPr id="2" name="Rubrik 1"/>
-          <p:cNvSpPr>
-            <a:spLocks noGrp="1"/>
-          </p:cNvSpPr>
-          <p:nvPr>
-            <p:ph type="title"/>
-          </p:nvPr>
-        </p:nvSpPr>
-        <p:spPr>
-          <a:xfrm>
-            <a:off x="457200" y="274638"/>
-            <a:ext cx="8229600" cy="1837934"/>
-          </a:xfrm>
-        </p:spPr>
-        <p:txBody>
-          <a:bodyPr>
-            <a:normAutofit/>
-          </a:bodyPr>
-          <a:lstStyle/>
-          <a:p>
-            <a:r>
-              <a:rPr lang="sv-SE" dirty="0" err="1" smtClean="0"/>
-              <a:t>Acknowledgments</a:t>
-            </a:r>
-            <a:r>
-              <a:rPr lang="sv-SE" dirty="0" smtClean="0"/>
-              <a:t> (</a:t>
-            </a:r>
-            <a:r>
-              <a:rPr lang="sv-SE" dirty="0" err="1" smtClean="0"/>
-              <a:t>if</a:t>
-            </a:r>
-            <a:r>
-              <a:rPr lang="sv-SE" dirty="0" smtClean="0"/>
-              <a:t> </a:t>
-            </a:r>
-            <a:r>
-              <a:rPr lang="sv-SE" dirty="0" err="1" smtClean="0"/>
-              <a:t>desired</a:t>
-            </a:r>
-            <a:r>
-              <a:rPr lang="sv-SE" dirty="0" smtClean="0"/>
-              <a:t>) and ”</a:t>
-            </a:r>
-            <a:r>
-              <a:rPr lang="sv-SE" dirty="0" err="1" smtClean="0"/>
-              <a:t>thank</a:t>
-            </a:r>
-            <a:r>
-              <a:rPr lang="sv-SE" dirty="0" smtClean="0"/>
-              <a:t> </a:t>
-            </a:r>
-            <a:r>
-              <a:rPr lang="sv-SE" dirty="0" err="1" smtClean="0"/>
-              <a:t>you</a:t>
-            </a:r>
-            <a:r>
-              <a:rPr lang="sv-SE" dirty="0" smtClean="0"/>
-              <a:t>” </a:t>
-            </a:r>
-            <a:r>
-              <a:rPr lang="sv-SE" dirty="0" err="1" smtClean="0"/>
-              <a:t>slide</a:t>
-            </a:r>
-            <a:endParaRPr lang="sv-SE" dirty="0"/>
-          </a:p>
-        </p:txBody>
-      </p:sp>
-    </p:spTree>
-    <p:extLst>
-      <p:ext uri="{BB962C8B-B14F-4D97-AF65-F5344CB8AC3E}">
-        <p14:creationId xmlns:p14="http://schemas.microsoft.com/office/powerpoint/2010/main" val="2060650186"/>
-      </p:ext>
-    </p:extLst>
-  </p:cSld>
-  <p:clrMapOvr>
-    <a:masterClrMapping/>
-  </p:clrMapOvr>
-</p:sld>
-</file>
-
 <file path=ppt/slides/slide2.xml><?xml version="1.0" encoding="utf-8"?>
 <p:sld xmlns:a="http://schemas.openxmlformats.org/drawingml/2006/main" xmlns:r="http://schemas.openxmlformats.org/officeDocument/2006/relationships" xmlns:p="http://schemas.openxmlformats.org/presentationml/2006/main">
   <p:cSld>
@@ -7273,13 +10898,6 @@
               </a:rPr>
               <a:t>Elektroniskt lärande (e-lärande) </a:t>
             </a:r>
-            <a:endParaRPr lang="sv-SE" sz="2000" dirty="0" smtClean="0">
-              <a:solidFill>
-                <a:srgbClr val="17375E"/>
-              </a:solidFill>
-              <a:latin typeface="Times New Roman"/>
-              <a:cs typeface="Times New Roman"/>
-            </a:endParaRPr>
           </a:p>
           <a:p>
             <a:pPr algn="l"/>
@@ -7574,17 +11192,7 @@
                 <a:latin typeface="Times New Roman"/>
                 <a:cs typeface="Times New Roman"/>
               </a:rPr>
-              <a:t>edagogiska riktlinjer och pedagogisk modell</a:t>
-            </a:r>
-            <a:r>
-              <a:rPr lang="sv-SE" sz="2000" dirty="0" smtClean="0">
-                <a:solidFill>
-                  <a:srgbClr val="17375E"/>
-                </a:solidFill>
-                <a:latin typeface="Times New Roman"/>
-                <a:cs typeface="Times New Roman"/>
-              </a:rPr>
-              <a:t> </a:t>
+              <a:t>edagogiska riktlinjer och pedagogisk modell </a:t>
             </a:r>
           </a:p>
           <a:p>
@@ -7972,7 +11580,7 @@
         <p:spPr>
           <a:xfrm>
             <a:off x="1282505" y="459701"/>
-            <a:ext cx="1650611" cy="316177"/>
+            <a:ext cx="1650611" cy="440315"/>
           </a:xfrm>
         </p:spPr>
         <p:txBody>
@@ -8088,33 +11696,6 @@
           <a:chExt cx="0" cy="0"/>
         </a:xfrm>
       </p:grpSpPr>
-      <p:sp>
-        <p:nvSpPr>
-          <p:cNvPr id="2" name="Rubrik 1"/>
-          <p:cNvSpPr>
-            <a:spLocks noGrp="1"/>
-          </p:cNvSpPr>
-          <p:nvPr>
-            <p:ph type="title"/>
-          </p:nvPr>
-        </p:nvSpPr>
-        <p:spPr/>
-        <p:txBody>
-          <a:bodyPr/>
-          <a:lstStyle/>
-          <a:p>
-            <a:r>
-              <a:rPr lang="sv-SE" dirty="0" err="1" smtClean="0"/>
-              <a:t>Figure</a:t>
-            </a:r>
-            <a:r>
-              <a:rPr lang="sv-SE" dirty="0" smtClean="0"/>
-              <a:t> 1B</a:t>
-            </a:r>
-            <a:endParaRPr lang="sv-SE" dirty="0"/>
-          </a:p>
-        </p:txBody>
-      </p:sp>
       <p:pic>
         <p:nvPicPr>
           <p:cNvPr id="4" name="Platshållare för innehåll 3" descr="figure1b.pdf"/>
@@ -8133,13 +11714,63 @@
               </a:ext>
             </a:extLst>
           </a:blip>
-          <a:srcRect t="17643" b="17643"/>
+          <a:srcRect l="-27265" r="-27265"/>
           <a:stretch>
             <a:fillRect/>
           </a:stretch>
         </p:blipFill>
-        <p:spPr/>
+        <p:spPr>
+          <a:xfrm>
+            <a:off x="295590" y="959093"/>
+            <a:ext cx="9179852" cy="5232835"/>
+          </a:xfrm>
+        </p:spPr>
       </p:pic>
+      <p:sp>
+        <p:nvSpPr>
+          <p:cNvPr id="5" name="Rubrik 1"/>
+          <p:cNvSpPr>
+            <a:spLocks noGrp="1"/>
+          </p:cNvSpPr>
+          <p:nvPr>
+            <p:ph type="title"/>
+          </p:nvPr>
+        </p:nvSpPr>
+        <p:spPr>
+          <a:xfrm>
+            <a:off x="517525" y="1072623"/>
+            <a:ext cx="1462187" cy="412162"/>
+          </a:xfrm>
+        </p:spPr>
+        <p:txBody>
+          <a:bodyPr>
+            <a:normAutofit fontScale="90000"/>
+          </a:bodyPr>
+          <a:lstStyle/>
+          <a:p>
+            <a:r>
+              <a:rPr lang="sv-SE" sz="2800" dirty="0" smtClean="0">
+                <a:solidFill>
+                  <a:srgbClr val="17375E"/>
+                </a:solidFill>
+                <a:latin typeface="Times New Roman"/>
+                <a:cs typeface="Times New Roman"/>
+              </a:rPr>
+              <a:t>Figur 2</a:t>
+            </a:r>
+            <a:r>
+              <a:rPr lang="sv-SE" sz="2800" dirty="0">
+                <a:solidFill>
+                  <a:srgbClr val="17375E"/>
+                </a:solidFill>
+                <a:latin typeface="Times New Roman"/>
+                <a:cs typeface="Times New Roman"/>
+              </a:rPr>
+              <a:t>B</a:t>
+            </a:r>
+          </a:p>
+        </p:txBody>
+      </p:sp>
     </p:spTree>
     <p:extLst>
       <p:ext uri="{BB962C8B-B14F-4D97-AF65-F5344CB8AC3E}">

</xml_diff>